<commit_message>
fixed some issues with data catalog, the mockup and others
</commit_message>
<xml_diff>
--- a/starter-template (3).pptx
+++ b/starter-template (3).pptx
@@ -3666,7 +3666,29 @@
 </p:sldLayout>
 </file>
 
-<file path=ppt/slideLayouts/slideLayout23.xml><?xml version="1.0" encoding="UTF-8" standalone="yes"?><p:sldLayout xmlns:a="http://schemas.openxmlformats.org/drawingml/2006/main" xmlns:r="http://schemas.openxmlformats.org/officeDocument/2006/relationships" xmlns:p="http://schemas.openxmlformats.org/presentationml/2006/main" xmlns:m="http://schemas.openxmlformats.org/officeDocument/2006/math" xmlns:w="http://schemas.openxmlformats.org/wordprocessingml/2006/main" matchingName="Title & Subtitle" preserve="0" showMasterPhAnim="0" type="title" userDrawn="1"><p:cSld name="TITLE"><p:spTree><p:nvGrpSpPr><p:cNvPr id="1" name=""></p:cNvPr><p:cNvGrpSpPr/><p:nvPr></p:nvPr></p:nvGrpSpPr><p:grpSpPr bwMode="auto"><a:xfrm><a:off x="0" y="0"></a:off><a:ext cx="0" cy="0"></a:ext><a:chOff x="0" y="0"></a:chOff><a:chExt cx="0" cy="0"></a:chExt></a:xfrm></p:grpSpPr><p:sp><p:nvSpPr><p:cNvPr id="124" name="Google Shape;124;p38"></p:cNvPr><p:cNvSpPr txBox="1"></p:cNvSpPr><p:nvPr><p:ph type="title"></p:ph></p:nvPr></p:nvSpPr><p:spPr bwMode="auto"><a:xfrm><a:off x="1540817" y="1689497"></a:off><a:ext cx="4690800" cy="3405000"></a:ext></a:xfrm><a:prstGeom prst="rect"><a:avLst/></a:prstGeom><a:noFill/><a:ln><a:noFill/></a:ln></p:spPr><p:txBody><a:bodyPr spcFirstLastPara="1" wrap="square" lIns="34275" tIns="34275" rIns="34275" bIns="34275" anchor="b" anchorCtr="0"><a:noAutofit/></a:bodyPr><a:lstStyle><a:lvl1pPr marL="0" marR="0" lvl="0" indent="0" algn="ctr"><a:lnSpc><a:spcPct val="100000"></a:spcPct></a:lnSpc><a:spcBef><a:spcPts val="0"></a:spcPts></a:spcBef><a:spcAft><a:spcPts val="0"></a:spcPts></a:spcAft><a:buClr><a:srgbClr val="000000"></a:srgbClr></a:buClr><a:buSzPts val="500"></a:buSzPts><a:buFont typeface="Helvetica Neue"></a:buFont><a:buNone/><a:defRPr sz="4200" b="0" i="0" u="none" strike="noStrike" cap="none"><a:solidFill><a:srgbClr val="000000"></a:srgbClr></a:solidFill><a:latin typeface="Helvetica Neue"></a:latin><a:ea typeface="Helvetica Neue"></a:ea><a:cs typeface="Helvetica Neue"></a:cs></a:defRPr></a:lvl1pPr><a:lvl2pPr marL="0" marR="0" lvl="1" indent="88900" algn="ctr"><a:lnSpc><a:spcPct val="100000"></a:spcPct></a:lnSpc><a:spcBef><a:spcPts val="0"></a:spcPts></a:spcBef><a:spcAft><a:spcPts val="0"></a:spcPts></a:spcAft><a:buClr><a:srgbClr val="000000"></a:srgbClr></a:buClr><a:buSzPts val="500"></a:buSzPts><a:buFont typeface="Helvetica Neue"></a:buFont><a:buNone/><a:defRPr sz="4200" b="0" i="0" u="none" strike="noStrike" cap="none"><a:solidFill><a:srgbClr val="000000"></a:srgbClr></a:solidFill><a:latin typeface="Helvetica Neue"></a:latin><a:ea typeface="Helvetica Neue"></a:ea><a:cs typeface="Helvetica Neue"></a:cs></a:defRPr></a:lvl2pPr><a:lvl3pPr marL="0" marR="0" lvl="2" indent="177800" algn="ctr"><a:lnSpc><a:spcPct val="100000"></a:spcPct></a:lnSpc><a:spcBef><a:spcPts val="0"></a:spcPts></a:spcBef><a:spcAft><a:spcPts val="0"></a:spcPts></a:spcAft><a:buClr><a:srgbClr val="000000"></a:srgbClr></a:buClr><a:buSzPts val="500"></a:buSzPts><a:buFont typeface="Helvetica Neue"></a:buFont><a:buNone/><a:defRPr sz="4200" b="0" i="0" u="none" strike="noStrike" cap="none"><a:solidFill><a:srgbClr val="000000"></a:srgbClr></a:solidFill><a:latin typeface="Helvetica Neue"></a:latin><a:ea typeface="Helvetica Neue"></a:ea><a:cs typeface="Helvetica Neue"></a:cs></a:defRPr></a:lvl3pPr><a:lvl4pPr marL="0" marR="0" lvl="3" indent="254000" algn="ctr"><a:lnSpc><a:spcPct val="100000"></a:spcPct></a:lnSpc><a:spcBef><a:spcPts val="0"></a:spcPts></a:spcBef><a:spcAft><a:spcPts val="0"></a:spcPts></a:spcAft><a:buClr><a:srgbClr val="000000"></a:srgbClr></a:buClr><a:buSzPts val="500"></a:buSzPts><a:buFont typeface="Helvetica Neue"></a:buFont><a:buNone/><a:defRPr sz="4200" b="0" i="0" u="none" strike="noStrike" cap="none"><a:solidFill><a:srgbClr val="000000"></a:srgbClr></a:solidFill><a:latin typeface="Helvetica Neue"></a:latin><a:ea typeface="Helvetica Neue"></a:ea><a:cs typeface="Helvetica Neue"></a:cs></a:defRPr></a:lvl4pPr><a:lvl5pPr marL="0" marR="0" lvl="4" indent="342900" algn="ctr"><a:lnSpc><a:spcPct val="100000"></a:spcPct></a:lnSpc><a:spcBef><a:spcPts val="0"></a:spcPts></a:spcBef><a:spcAft><a:spcPts val="0"></a:spcPts></a:spcAft><a:buClr><a:srgbClr val="000000"></a:srgbClr></a:buClr><a:buSzPts val="500"></a:buSzPts><a:buFont typeface="Helvetica Neue"></a:buFont><a:buNone/><a:defRPr sz="4200" b="0" i="0" u="none" strike="noStrike" cap="none"><a:solidFill><a:srgbClr val="000000"></a:srgbClr></a:solidFill><a:latin typeface="Helvetica Neue"></a:latin><a:ea typeface="Helvetica Neue"></a:ea><a:cs typeface="Helvetica Neue"></a:cs></a:defRPr></a:lvl5pPr><a:lvl6pPr marL="0" marR="0" lvl="5" indent="431799" algn="ctr"><a:lnSpc><a:spcPct val="100000"></a:spcPct></a:lnSpc><a:spcBef><a:spcPts val="0"></a:spcPts></a:spcBef><a:spcAft><a:spcPts val="0"></a:spcPts></a:spcAft><a:buClr><a:srgbClr val="000000"></a:srgbClr></a:buClr><a:buSzPts val="500"></a:buSzPts><a:buFont typeface="Helvetica Neue"></a:buFont><a:buNone/><a:defRPr sz="4200" b="0" i="0" u="none" strike="noStrike" cap="none"><a:solidFill><a:srgbClr val="000000"></a:srgbClr></a:solidFill><a:latin typeface="Helvetica Neue"></a:latin><a:ea typeface="Helvetica Neue"></a:ea><a:cs typeface="Helvetica Neue"></a:cs></a:defRPr></a:lvl6pPr><a:lvl7pPr marL="0" marR="0" lvl="6" indent="520700" algn="ctr"><a:lnSpc><a:spcPct val="100000"></a:spcPct></a:lnSpc><a:spcBef><a:spcPts val="0"></a:spcPts></a:spcBef><a:spcAft><a:spcPts val="0"></a:spcPts></a:spcAft><a:buClr><a:srgbClr val="000000"></a:srgbClr></a:buClr><a:buSzPts val="500"></a:buSzPts><a:buFont typeface="Helvetica Neue"></a:buFont><a:buNone/><a:defRPr sz="4200" b="0" i="0" u="none" strike="noStrike" cap="none"><a:solidFill><a:srgbClr val="000000"></a:srgbClr></a:solidFill><a:latin typeface="Helvetica Neue"></a:latin><a:ea typeface="Helvetica Neue"></a:ea><a:cs typeface="Helvetica Neue"></a:cs></a:defRPr></a:lvl7pPr><a:lvl8pPr marL="0" marR="0" lvl="7" indent="596900" algn="ctr"><a:lnSpc><a:spcPct val="100000"></a:spcPct></a:lnSpc><a:spcBef><a:spcPts val="0"></a:spcPts></a:spcBef><a:spcAft><a:spcPts val="0"></a:spcPts></a:spcAft><a:buClr><a:srgbClr val="000000"></a:srgbClr></a:buClr><a:buSzPts val="500"></a:buSzPts><a:buFont typeface="Helvetica Neue"></a:buFont><a:buNone/><a:defRPr sz="4200" b="0" i="0" u="none" strike="noStrike" cap="none"><a:solidFill><a:srgbClr val="000000"></a:srgbClr></a:solidFill><a:latin typeface="Helvetica Neue"></a:latin><a:ea typeface="Helvetica Neue"></a:ea><a:cs typeface="Helvetica Neue"></a:cs></a:defRPr></a:lvl8pPr><a:lvl9pPr marL="0" marR="0" lvl="8" indent="685800" algn="ctr"><a:lnSpc><a:spcPct val="100000"></a:spcPct></a:lnSpc><a:spcBef><a:spcPts val="0"></a:spcPts></a:spcBef><a:spcAft><a:spcPts val="0"></a:spcPts></a:spcAft><a:buClr><a:srgbClr val="000000"></a:srgbClr></a:buClr><a:buSzPts val="500"></a:buSzPts><a:buFont typeface="Helvetica Neue"></a:buFont><a:buNone/><a:defRPr sz="4200" b="0" i="0" u="none" strike="noStrike" cap="none"><a:solidFill><a:srgbClr val="000000"></a:srgbClr></a:solidFill><a:latin typeface="Helvetica Neue"></a:latin><a:ea typeface="Helvetica Neue"></a:ea><a:cs typeface="Helvetica Neue"></a:cs></a:defRPr></a:lvl9pPr></a:lstStyle><a:p><a:pPr><a:defRPr></a:defRPr></a:pPr><a:endParaRPr></a:endParaRPr></a:p></p:txBody></p:sp><p:sp><p:nvSpPr><p:cNvPr id="125" name="Google Shape;125;p38"></p:cNvPr><p:cNvSpPr txBox="1"></p:cNvSpPr><p:nvPr><p:ph type="body" idx="1"></p:ph></p:nvPr></p:nvSpPr><p:spPr bwMode="auto"><a:xfrm><a:off x="1540817" y="5186362"></a:off><a:ext cx="4690800" cy="1165800"></a:ext></a:xfrm><a:prstGeom prst="rect"><a:avLst/></a:prstGeom><a:noFill/><a:ln><a:noFill/></a:ln></p:spPr><p:txBody><a:bodyPr spcFirstLastPara="1" wrap="square" lIns="34275" tIns="34275" rIns="34275" bIns="34275" anchor="t" anchorCtr="0"><a:noAutofit/></a:bodyPr><a:lstStyle><a:lvl1pPr marL="457200" marR="0" lvl="0" indent="-228600" algn="ctr"><a:lnSpc><a:spcPct val="100000"></a:spcPct></a:lnSpc><a:spcBef><a:spcPts val="0"></a:spcPts></a:spcBef><a:spcAft><a:spcPts val="0"></a:spcPts></a:spcAft><a:buClr><a:srgbClr val="000000"></a:srgbClr></a:buClr><a:buSzPts val="1400"></a:buSzPts><a:buFont typeface="Helvetica Neue"></a:buFont><a:buNone/><a:defRPr sz="1700" b="0" i="0" u="none" strike="noStrike" cap="none"><a:solidFill><a:srgbClr val="000000"></a:srgbClr></a:solidFill><a:latin typeface="Helvetica Neue"></a:latin><a:ea typeface="Helvetica Neue"></a:ea><a:cs typeface="Helvetica Neue"></a:cs></a:defRPr></a:lvl1pPr><a:lvl2pPr marL="914400" marR="0" lvl="1" indent="-228600" algn="ctr"><a:lnSpc><a:spcPct val="100000"></a:spcPct></a:lnSpc><a:spcBef><a:spcPts val="0"></a:spcPts></a:spcBef><a:spcAft><a:spcPts val="0"></a:spcPts></a:spcAft><a:buClr><a:srgbClr val="000000"></a:srgbClr></a:buClr><a:buSzPts val="1400"></a:buSzPts><a:buFont typeface="Helvetica Neue"></a:buFont><a:buNone/><a:defRPr sz="1700" b="0" i="0" u="none" strike="noStrike" cap="none"><a:solidFill><a:srgbClr val="000000"></a:srgbClr></a:solidFill><a:latin typeface="Helvetica Neue"></a:latin><a:ea typeface="Helvetica Neue"></a:ea><a:cs typeface="Helvetica Neue"></a:cs></a:defRPr></a:lvl2pPr><a:lvl3pPr marL="1371600" marR="0" lvl="2" indent="-228600" algn="ctr"><a:lnSpc><a:spcPct val="100000"></a:spcPct></a:lnSpc><a:spcBef><a:spcPts val="0"></a:spcPts></a:spcBef><a:spcAft><a:spcPts val="0"></a:spcPts></a:spcAft><a:buClr><a:srgbClr val="000000"></a:srgbClr></a:buClr><a:buSzPts val="1400"></a:buSzPts><a:buFont typeface="Helvetica Neue"></a:buFont><a:buNone/><a:defRPr sz="1700" b="0" i="0" u="none" strike="noStrike" cap="none"><a:solidFill><a:srgbClr val="000000"></a:srgbClr></a:solidFill><a:latin typeface="Helvetica Neue"></a:latin><a:ea typeface="Helvetica Neue"></a:ea><a:cs typeface="Helvetica Neue"></a:cs></a:defRPr></a:lvl3pPr><a:lvl4pPr marL="1828800" marR="0" lvl="3" indent="-228600" algn="ctr"><a:lnSpc><a:spcPct val="100000"></a:spcPct></a:lnSpc><a:spcBef><a:spcPts val="0"></a:spcPts></a:spcBef><a:spcAft><a:spcPts val="0"></a:spcPts></a:spcAft><a:buClr><a:srgbClr val="000000"></a:srgbClr></a:buClr><a:buSzPts val="1400"></a:buSzPts><a:buFont typeface="Helvetica Neue"></a:buFont><a:buNone/><a:defRPr sz="1700" b="0" i="0" u="none" strike="noStrike" cap="none"><a:solidFill><a:srgbClr val="000000"></a:srgbClr></a:solidFill><a:latin typeface="Helvetica Neue"></a:latin><a:ea typeface="Helvetica Neue"></a:ea><a:cs typeface="Helvetica Neue"></a:cs></a:defRPr></a:lvl4pPr><a:lvl5pPr marL="2286000" marR="0" lvl="4" indent="-228600" algn="ctr"><a:lnSpc><a:spcPct val="100000"></a:spcPct></a:lnSpc><a:spcBef><a:spcPts val="0"></a:spcPts></a:spcBef><a:spcAft><a:spcPts val="0"></a:spcPts></a:spcAft><a:buClr><a:srgbClr val="000000"></a:srgbClr></a:buClr><a:buSzPts val="1400"></a:buSzPts><a:buFont typeface="Helvetica Neue"></a:buFont><a:buNone/><a:defRPr sz="1700" b="0" i="0" u="none" strike="noStrike" cap="none"><a:solidFill><a:srgbClr val="000000"></a:srgbClr></a:solidFill><a:latin typeface="Helvetica Neue"></a:latin><a:ea typeface="Helvetica Neue"></a:ea><a:cs typeface="Helvetica Neue"></a:cs></a:defRPr></a:lvl5pPr><a:lvl6pPr marL="2743200" marR="0" lvl="5" indent="-317500" algn="l"><a:lnSpc><a:spcPct val="100000"></a:spcPct></a:lnSpc><a:spcBef><a:spcPts val="2200"></a:spcPts></a:spcBef><a:spcAft><a:spcPts val="0"></a:spcPts></a:spcAft><a:buClr><a:srgbClr val="000000"></a:srgbClr></a:buClr><a:buSzPts val="1400"></a:buSzPts><a:buFont typeface="Helvetica Neue"></a:buFont><a:buChar char="•"></a:buChar><a:defRPr sz="1900" b="0" i="0" u="none" strike="noStrike" cap="none"><a:solidFill><a:srgbClr val="000000"></a:srgbClr></a:solidFill><a:latin typeface="Helvetica Neue"></a:latin><a:ea typeface="Helvetica Neue"></a:ea><a:cs typeface="Helvetica Neue"></a:cs></a:defRPr></a:lvl6pPr><a:lvl7pPr marL="3200400" marR="0" lvl="6" indent="-317500" algn="l"><a:lnSpc><a:spcPct val="100000"></a:spcPct></a:lnSpc><a:spcBef><a:spcPts val="2200"></a:spcPts></a:spcBef><a:spcAft><a:spcPts val="0"></a:spcPts></a:spcAft><a:buClr><a:srgbClr val="000000"></a:srgbClr></a:buClr><a:buSzPts val="1400"></a:buSzPts><a:buFont typeface="Helvetica Neue"></a:buFont><a:buChar char="•"></a:buChar><a:defRPr sz="1900" b="0" i="0" u="none" strike="noStrike" cap="none"><a:solidFill><a:srgbClr val="000000"></a:srgbClr></a:solidFill><a:latin typeface="Helvetica Neue"></a:latin><a:ea typeface="Helvetica Neue"></a:ea><a:cs typeface="Helvetica Neue"></a:cs></a:defRPr></a:lvl7pPr><a:lvl8pPr marL="3657600" marR="0" lvl="7" indent="-317500" algn="l"><a:lnSpc><a:spcPct val="100000"></a:spcPct></a:lnSpc><a:spcBef><a:spcPts val="2200"></a:spcPts></a:spcBef><a:spcAft><a:spcPts val="0"></a:spcPts></a:spcAft><a:buClr><a:srgbClr val="000000"></a:srgbClr></a:buClr><a:buSzPts val="1400"></a:buSzPts><a:buFont typeface="Helvetica Neue"></a:buFont><a:buChar char="•"></a:buChar><a:defRPr sz="1900" b="0" i="0" u="none" strike="noStrike" cap="none"><a:solidFill><a:srgbClr val="000000"></a:srgbClr></a:solidFill><a:latin typeface="Helvetica Neue"></a:latin><a:ea typeface="Helvetica Neue"></a:ea><a:cs typeface="Helvetica Neue"></a:cs></a:defRPr></a:lvl8pPr><a:lvl9pPr marL="4114800" marR="0" lvl="8" indent="-317500" algn="l"><a:lnSpc><a:spcPct val="100000"></a:spcPct></a:lnSpc><a:spcBef><a:spcPts val="2200"></a:spcPts></a:spcBef><a:spcAft><a:spcPts val="0"></a:spcPts></a:spcAft><a:buClr><a:srgbClr val="000000"></a:srgbClr></a:buClr><a:buSzPts val="1400"></a:buSzPts><a:buFont typeface="Helvetica Neue"></a:buFont><a:buChar char="•"></a:buChar><a:defRPr sz="1900" b="0" i="0" u="none" strike="noStrike" cap="none"><a:solidFill><a:srgbClr val="000000"></a:srgbClr></a:solidFill><a:latin typeface="Helvetica Neue"></a:latin><a:ea typeface="Helvetica Neue"></a:ea><a:cs typeface="Helvetica Neue"></a:cs></a:defRPr></a:lvl9pPr></a:lstStyle><a:p><a:pPr><a:defRPr></a:defRPr></a:pPr><a:endParaRPr></a:endParaRPr></a:p></p:txBody></p:sp><p:sp><p:nvSpPr><p:cNvPr id="126" name="Google Shape;126;p38"></p:cNvPr><p:cNvSpPr txBox="1"></p:cNvSpPr><p:nvPr><p:ph type="sldNum" idx="12"></p:ph></p:nvPr></p:nvSpPr><p:spPr bwMode="auto"><a:xfrm><a:off x="3804541" y="9541073"></a:off><a:ext cx="157500" cy="375000"></a:ext></a:xfrm><a:prstGeom prst="rect"><a:avLst/></a:prstGeom><a:noFill/><a:ln><a:noFill/></a:ln></p:spPr><p:txBody><a:bodyPr spcFirstLastPara="1" wrap="square" lIns="26775" tIns="26775" rIns="26775" bIns="26775" anchor="t" anchorCtr="0"><a:noAutofit/></a:bodyPr><a:lstStyle><a:lvl1pPr marL="0" marR="0" lvl="0" indent="0" algn="ctr"><a:lnSpc><a:spcPct val="100000"></a:spcPct></a:lnSpc><a:spcBef><a:spcPts val="0"></a:spcPts></a:spcBef><a:spcAft><a:spcPts val="0"></a:spcPts></a:spcAft><a:buClr><a:srgbClr val="000000"></a:srgbClr></a:buClr><a:buFont typeface="Helvetica Neue"></a:buFont><a:buNone/><a:defRPr sz="900" b="0" i="0" u="none" strike="noStrike" cap="none"><a:solidFill><a:srgbClr val="000000"></a:srgbClr></a:solidFill><a:latin typeface="Helvetica Neue"></a:latin><a:ea typeface="Helvetica Neue"></a:ea><a:cs typeface="Helvetica Neue"></a:cs></a:defRPr></a:lvl1pPr><a:lvl2pPr marL="0" marR="0" lvl="1" indent="0" algn="ctr"><a:lnSpc><a:spcPct val="100000"></a:spcPct></a:lnSpc><a:spcBef><a:spcPts val="0"></a:spcPts></a:spcBef><a:spcAft><a:spcPts val="0"></a:spcPts></a:spcAft><a:buClr><a:srgbClr val="000000"></a:srgbClr></a:buClr><a:buFont typeface="Helvetica Neue"></a:buFont><a:buNone/><a:defRPr sz="900" b="0" i="0" u="none" strike="noStrike" cap="none"><a:solidFill><a:srgbClr val="000000"></a:srgbClr></a:solidFill><a:latin typeface="Helvetica Neue"></a:latin><a:ea typeface="Helvetica Neue"></a:ea><a:cs typeface="Helvetica Neue"></a:cs></a:defRPr></a:lvl2pPr><a:lvl3pPr marL="0" marR="0" lvl="2" indent="0" algn="ctr"><a:lnSpc><a:spcPct val="100000"></a:spcPct></a:lnSpc><a:spcBef><a:spcPts val="0"></a:spcPts></a:spcBef><a:spcAft><a:spcPts val="0"></a:spcPts></a:spcAft><a:buClr><a:srgbClr val="000000"></a:srgbClr></a:buClr><a:buFont typeface="Helvetica Neue"></a:buFont><a:buNone/><a:defRPr sz="900" b="0" i="0" u="none" strike="noStrike" cap="none"><a:solidFill><a:srgbClr val="000000"></a:srgbClr></a:solidFill><a:latin typeface="Helvetica Neue"></a:latin><a:ea typeface="Helvetica Neue"></a:ea><a:cs typeface="Helvetica Neue"></a:cs></a:defRPr></a:lvl3pPr><a:lvl4pPr marL="0" marR="0" lvl="3" indent="0" algn="ctr"><a:lnSpc><a:spcPct val="100000"></a:spcPct></a:lnSpc><a:spcBef><a:spcPts val="0"></a:spcPts></a:spcBef><a:spcAft><a:spcPts val="0"></a:spcPts></a:spcAft><a:buClr><a:srgbClr val="000000"></a:srgbClr></a:buClr><a:buFont typeface="Helvetica Neue"></a:buFont><a:buNone/><a:defRPr sz="900" b="0" i="0" u="none" strike="noStrike" cap="none"><a:solidFill><a:srgbClr val="000000"></a:srgbClr></a:solidFill><a:latin typeface="Helvetica Neue"></a:latin><a:ea typeface="Helvetica Neue"></a:ea><a:cs typeface="Helvetica Neue"></a:cs></a:defRPr></a:lvl4pPr><a:lvl5pPr marL="0" marR="0" lvl="4" indent="0" algn="ctr"><a:lnSpc><a:spcPct val="100000"></a:spcPct></a:lnSpc><a:spcBef><a:spcPts val="0"></a:spcPts></a:spcBef><a:spcAft><a:spcPts val="0"></a:spcPts></a:spcAft><a:buClr><a:srgbClr val="000000"></a:srgbClr></a:buClr><a:buFont typeface="Helvetica Neue"></a:buFont><a:buNone/><a:defRPr sz="900" b="0" i="0" u="none" strike="noStrike" cap="none"><a:solidFill><a:srgbClr val="000000"></a:srgbClr></a:solidFill><a:latin typeface="Helvetica Neue"></a:latin><a:ea typeface="Helvetica Neue"></a:ea><a:cs typeface="Helvetica Neue"></a:cs></a:defRPr></a:lvl5pPr><a:lvl6pPr marL="0" marR="0" lvl="5" indent="0" algn="ctr"><a:lnSpc><a:spcPct val="100000"></a:spcPct></a:lnSpc><a:spcBef><a:spcPts val="0"></a:spcPts></a:spcBef><a:spcAft><a:spcPts val="0"></a:spcPts></a:spcAft><a:buClr><a:srgbClr val="000000"></a:srgbClr></a:buClr><a:buFont typeface="Helvetica Neue"></a:buFont><a:buNone/><a:defRPr sz="900" b="0" i="0" u="none" strike="noStrike" cap="none"><a:solidFill><a:srgbClr val="000000"></a:srgbClr></a:solidFill><a:latin typeface="Helvetica Neue"></a:latin><a:ea typeface="Helvetica Neue"></a:ea><a:cs typeface="Helvetica Neue"></a:cs></a:defRPr></a:lvl6pPr><a:lvl7pPr marL="0" marR="0" lvl="6" indent="0" algn="ctr"><a:lnSpc><a:spcPct val="100000"></a:spcPct></a:lnSpc><a:spcBef><a:spcPts val="0"></a:spcPts></a:spcBef><a:spcAft><a:spcPts val="0"></a:spcPts></a:spcAft><a:buClr><a:srgbClr val="000000"></a:srgbClr></a:buClr><a:buFont typeface="Helvetica Neue"></a:buFont><a:buNone/><a:defRPr sz="900" b="0" i="0" u="none" strike="noStrike" cap="none"><a:solidFill><a:srgbClr val="000000"></a:srgbClr></a:solidFill><a:latin typeface="Helvetica Neue"></a:latin><a:ea typeface="Helvetica Neue"></a:ea><a:cs typeface="Helvetica Neue"></a:cs></a:defRPr></a:lvl7pPr><a:lvl8pPr marL="0" marR="0" lvl="7" indent="0" algn="ctr"><a:lnSpc><a:spcPct val="100000"></a:spcPct></a:lnSpc><a:spcBef><a:spcPts val="0"></a:spcPts></a:spcBef><a:spcAft><a:spcPts val="0"></a:spcPts></a:spcAft><a:buClr><a:srgbClr val="000000"></a:srgbClr></a:buClr><a:buFont typeface="Helvetica Neue"></a:buFont><a:buNone/><a:defRPr sz="900" b="0" i="0" u="none" strike="noStrike" cap="none"><a:solidFill><a:srgbClr val="000000"></a:srgbClr></a:solidFill><a:latin typeface="Helvetica Neue"></a:latin><a:ea typeface="Helvetica Neue"></a:ea><a:cs typeface="Helvetica Neue"></a:cs></a:defRPr></a:lvl8pPr><a:lvl9pPr marL="0" marR="0" lvl="8" indent="0" algn="ctr"><a:lnSpc><a:spcPct val="100000"></a:spcPct></a:lnSpc><a:spcBef><a:spcPts val="0"></a:spcPts></a:spcBef><a:spcAft><a:spcPts val="0"></a:spcPts></a:spcAft><a:buClr><a:srgbClr val="000000"></a:srgbClr></a:buClr><a:buFont typeface="Helvetica Neue"></a:buFont><a:buNone/><a:defRPr sz="900" b="0" i="0" u="none" strike="noStrike" cap="none"><a:solidFill><a:srgbClr val="000000"></a:srgbClr></a:solidFill><a:latin typeface="Helvetica Neue"></a:latin><a:ea typeface="Helvetica Neue"></a:ea><a:cs typeface="Helvetica Neue"></a:cs></a:defRPr></a:lvl9pPr></a:lstStyle><a:p><a:pPr marL="0" lvl="0" indent="0" algn="ctr"><a:spcBef><a:spcPts val="0"></a:spcPts></a:spcBef><a:spcAft><a:spcPts val="0"></a:spcPts></a:spcAft><a:buNone/><a:defRPr></a:defRPr></a:pPr><a:fld id="{00000000-1234-1234-1234-123412341234}" type="slidenum"><a:rPr lang="en"></a:rPr><a:t></a:t></a:fld><a:endParaRPr></a:endParaRPr></a:p></p:txBody></p:sp></p:spTree></p:cSld><p:clrMapOvr><a:masterClrMapping/></p:clrMapOvr></p:sldLayout>
+<file path=ppt/slideLayouts/slideLayout23.xml><?xml version="1.0" encoding="utf-8"?>
+<p:sldLayout xmlns:a="http://schemas.openxmlformats.org/drawingml/2006/main" xmlns:r="http://schemas.openxmlformats.org/officeDocument/2006/relationships" xmlns:p="http://schemas.openxmlformats.org/presentationml/2006/main" xmlns:m="http://schemas.openxmlformats.org/officeDocument/2006/math" xmlns:w="http://schemas.openxmlformats.org/wordprocessingml/2006/main" matchingName="" preserve="0" showMasterPhAnim="0" userDrawn="1">
+  <p:cSld name="">
+    <p:spTree>
+      <p:nvGrpSpPr>
+        <p:cNvPr id="1" name=""/>
+        <p:cNvGrpSpPr/>
+        <p:nvPr/>
+      </p:nvGrpSpPr>
+      <p:grpSpPr bwMode="auto">
+        <a:xfrm>
+          <a:off x="0" y="0"/>
+          <a:ext cx="0" cy="0"/>
+          <a:chOff x="0" y="0"/>
+          <a:chExt cx="0" cy="0"/>
+        </a:xfrm>
+      </p:grpSpPr>
+    </p:spTree>
+  </p:cSld>
+  <p:clrMapOvr>
+    <a:masterClrMapping/>
+  </p:clrMapOvr>
+</p:sldLayout>
 </file>
 
 <file path=ppt/slideLayouts/slideLayout24.xml><?xml version="1.0" encoding="utf-8"?>
@@ -6897,10 +6919,54 @@
 </p:sldLayout>
 </file>
 
-<file path=ppt/slideLayouts/slideLayout28.xml><?xml version="1.0" encoding="UTF-8" standalone="yes"?><p:sldLayout xmlns:a="http://schemas.openxmlformats.org/drawingml/2006/main" xmlns:r="http://schemas.openxmlformats.org/officeDocument/2006/relationships" xmlns:p="http://schemas.openxmlformats.org/presentationml/2006/main" xmlns:m="http://schemas.openxmlformats.org/officeDocument/2006/math" xmlns:w="http://schemas.openxmlformats.org/wordprocessingml/2006/main" matchingName="Title & Bullets" preserve="0" showMasterPhAnim="0" userDrawn="1"><p:cSld name="Title &amp; Bullets"><p:spTree><p:nvGrpSpPr><p:cNvPr id="1" name=""></p:cNvPr><p:cNvGrpSpPr/><p:nvPr></p:nvPr></p:nvGrpSpPr><p:grpSpPr bwMode="auto"><a:xfrm><a:off x="0" y="0"></a:off><a:ext cx="0" cy="0"></a:ext><a:chOff x="0" y="0"></a:chOff><a:chExt cx="0" cy="0"></a:chExt></a:xfrm></p:grpSpPr><p:sp><p:nvSpPr><p:cNvPr id="144" name="Google Shape;144;p43"></p:cNvPr><p:cNvSpPr txBox="1"></p:cNvSpPr><p:nvPr><p:ph type="title"></p:ph></p:nvPr></p:nvSpPr><p:spPr bwMode="auto"><a:xfrm><a:off x="1398501" y="458391"></a:off><a:ext cx="4975200" cy="2226300"></a:ext></a:xfrm><a:prstGeom prst="rect"><a:avLst/></a:prstGeom><a:noFill/><a:ln><a:noFill/></a:ln></p:spPr><p:txBody><a:bodyPr spcFirstLastPara="1" wrap="square" lIns="34275" tIns="34275" rIns="34275" bIns="34275" anchor="ctr" anchorCtr="0"><a:noAutofit/></a:bodyPr><a:lstStyle><a:lvl1pPr marL="0" marR="0" lvl="0" indent="0" algn="ctr"><a:lnSpc><a:spcPct val="100000"></a:spcPct></a:lnSpc><a:spcBef><a:spcPts val="0"></a:spcPts></a:spcBef><a:spcAft><a:spcPts val="0"></a:spcPts></a:spcAft><a:buClr><a:srgbClr val="000000"></a:srgbClr></a:buClr><a:buSzPts val="500"></a:buSzPts><a:buFont typeface="Helvetica Neue"></a:buFont><a:buNone/><a:defRPr sz="4200" b="0" i="0" u="none" strike="noStrike" cap="none"><a:solidFill><a:srgbClr val="000000"></a:srgbClr></a:solidFill><a:latin typeface="Helvetica Neue"></a:latin><a:ea typeface="Helvetica Neue"></a:ea><a:cs typeface="Helvetica Neue"></a:cs></a:defRPr></a:lvl1pPr><a:lvl2pPr marL="0" marR="0" lvl="1" indent="88900" algn="ctr"><a:lnSpc><a:spcPct val="100000"></a:spcPct></a:lnSpc><a:spcBef><a:spcPts val="0"></a:spcPts></a:spcBef><a:spcAft><a:spcPts val="0"></a:spcPts></a:spcAft><a:buClr><a:srgbClr val="000000"></a:srgbClr></a:buClr><a:buSzPts val="500"></a:buSzPts><a:buFont typeface="Helvetica Neue"></a:buFont><a:buNone/><a:defRPr sz="4200" b="0" i="0" u="none" strike="noStrike" cap="none"><a:solidFill><a:srgbClr val="000000"></a:srgbClr></a:solidFill><a:latin typeface="Helvetica Neue"></a:latin><a:ea typeface="Helvetica Neue"></a:ea><a:cs typeface="Helvetica Neue"></a:cs></a:defRPr></a:lvl2pPr><a:lvl3pPr marL="0" marR="0" lvl="2" indent="177800" algn="ctr"><a:lnSpc><a:spcPct val="100000"></a:spcPct></a:lnSpc><a:spcBef><a:spcPts val="0"></a:spcPts></a:spcBef><a:spcAft><a:spcPts val="0"></a:spcPts></a:spcAft><a:buClr><a:srgbClr val="000000"></a:srgbClr></a:buClr><a:buSzPts val="500"></a:buSzPts><a:buFont typeface="Helvetica Neue"></a:buFont><a:buNone/><a:defRPr sz="4200" b="0" i="0" u="none" strike="noStrike" cap="none"><a:solidFill><a:srgbClr val="000000"></a:srgbClr></a:solidFill><a:latin typeface="Helvetica Neue"></a:latin><a:ea typeface="Helvetica Neue"></a:ea><a:cs typeface="Helvetica Neue"></a:cs></a:defRPr></a:lvl3pPr><a:lvl4pPr marL="0" marR="0" lvl="3" indent="254000" algn="ctr"><a:lnSpc><a:spcPct val="100000"></a:spcPct></a:lnSpc><a:spcBef><a:spcPts val="0"></a:spcPts></a:spcBef><a:spcAft><a:spcPts val="0"></a:spcPts></a:spcAft><a:buClr><a:srgbClr val="000000"></a:srgbClr></a:buClr><a:buSzPts val="500"></a:buSzPts><a:buFont typeface="Helvetica Neue"></a:buFont><a:buNone/><a:defRPr sz="4200" b="0" i="0" u="none" strike="noStrike" cap="none"><a:solidFill><a:srgbClr val="000000"></a:srgbClr></a:solidFill><a:latin typeface="Helvetica Neue"></a:latin><a:ea typeface="Helvetica Neue"></a:ea><a:cs typeface="Helvetica Neue"></a:cs></a:defRPr></a:lvl4pPr><a:lvl5pPr marL="0" marR="0" lvl="4" indent="342900" algn="ctr"><a:lnSpc><a:spcPct val="100000"></a:spcPct></a:lnSpc><a:spcBef><a:spcPts val="0"></a:spcPts></a:spcBef><a:spcAft><a:spcPts val="0"></a:spcPts></a:spcAft><a:buClr><a:srgbClr val="000000"></a:srgbClr></a:buClr><a:buSzPts val="500"></a:buSzPts><a:buFont typeface="Helvetica Neue"></a:buFont><a:buNone/><a:defRPr sz="4200" b="0" i="0" u="none" strike="noStrike" cap="none"><a:solidFill><a:srgbClr val="000000"></a:srgbClr></a:solidFill><a:latin typeface="Helvetica Neue"></a:latin><a:ea typeface="Helvetica Neue"></a:ea><a:cs typeface="Helvetica Neue"></a:cs></a:defRPr></a:lvl5pPr><a:lvl6pPr marL="0" marR="0" lvl="5" indent="431799" algn="ctr"><a:lnSpc><a:spcPct val="100000"></a:spcPct></a:lnSpc><a:spcBef><a:spcPts val="0"></a:spcPts></a:spcBef><a:spcAft><a:spcPts val="0"></a:spcPts></a:spcAft><a:buClr><a:srgbClr val="000000"></a:srgbClr></a:buClr><a:buSzPts val="500"></a:buSzPts><a:buFont typeface="Helvetica Neue"></a:buFont><a:buNone/><a:defRPr sz="4200" b="0" i="0" u="none" strike="noStrike" cap="none"><a:solidFill><a:srgbClr val="000000"></a:srgbClr></a:solidFill><a:latin typeface="Helvetica Neue"></a:latin><a:ea typeface="Helvetica Neue"></a:ea><a:cs typeface="Helvetica Neue"></a:cs></a:defRPr></a:lvl6pPr><a:lvl7pPr marL="0" marR="0" lvl="6" indent="520700" algn="ctr"><a:lnSpc><a:spcPct val="100000"></a:spcPct></a:lnSpc><a:spcBef><a:spcPts val="0"></a:spcPts></a:spcBef><a:spcAft><a:spcPts val="0"></a:spcPts></a:spcAft><a:buClr><a:srgbClr val="000000"></a:srgbClr></a:buClr><a:buSzPts val="500"></a:buSzPts><a:buFont typeface="Helvetica Neue"></a:buFont><a:buNone/><a:defRPr sz="4200" b="0" i="0" u="none" strike="noStrike" cap="none"><a:solidFill><a:srgbClr val="000000"></a:srgbClr></a:solidFill><a:latin typeface="Helvetica Neue"></a:latin><a:ea typeface="Helvetica Neue"></a:ea><a:cs typeface="Helvetica Neue"></a:cs></a:defRPr></a:lvl7pPr><a:lvl8pPr marL="0" marR="0" lvl="7" indent="596900" algn="ctr"><a:lnSpc><a:spcPct val="100000"></a:spcPct></a:lnSpc><a:spcBef><a:spcPts val="0"></a:spcPts></a:spcBef><a:spcAft><a:spcPts val="0"></a:spcPts></a:spcAft><a:buClr><a:srgbClr val="000000"></a:srgbClr></a:buClr><a:buSzPts val="500"></a:buSzPts><a:buFont typeface="Helvetica Neue"></a:buFont><a:buNone/><a:defRPr sz="4200" b="0" i="0" u="none" strike="noStrike" cap="none"><a:solidFill><a:srgbClr val="000000"></a:srgbClr></a:solidFill><a:latin typeface="Helvetica Neue"></a:latin><a:ea typeface="Helvetica Neue"></a:ea><a:cs typeface="Helvetica Neue"></a:cs></a:defRPr></a:lvl8pPr><a:lvl9pPr marL="0" marR="0" lvl="8" indent="685800" algn="ctr"><a:lnSpc><a:spcPct val="100000"></a:spcPct></a:lnSpc><a:spcBef><a:spcPts val="0"></a:spcPts></a:spcBef><a:spcAft><a:spcPts val="0"></a:spcPts></a:spcAft><a:buClr><a:srgbClr val="000000"></a:srgbClr></a:buClr><a:buSzPts val="500"></a:buSzPts><a:buFont typeface="Helvetica Neue"></a:buFont><a:buNone/><a:defRPr sz="4200" b="0" i="0" u="none" strike="noStrike" cap="none"><a:solidFill><a:srgbClr val="000000"></a:srgbClr></a:solidFill><a:latin typeface="Helvetica Neue"></a:latin><a:ea typeface="Helvetica Neue"></a:ea><a:cs typeface="Helvetica Neue"></a:cs></a:defRPr></a:lvl9pPr></a:lstStyle><a:p><a:pPr><a:defRPr></a:defRPr></a:pPr><a:endParaRPr></a:endParaRPr></a:p></p:txBody></p:sp><p:sp><p:nvSpPr><p:cNvPr id="145" name="Google Shape;145;p43"></p:cNvPr><p:cNvSpPr txBox="1"></p:cNvSpPr><p:nvPr><p:ph type="body" idx="1"></p:ph></p:nvPr></p:nvSpPr><p:spPr bwMode="auto"><a:xfrm><a:off x="1398501" y="2684858"></a:off><a:ext cx="4975200" cy="6482700"></a:ext></a:xfrm><a:prstGeom prst="rect"><a:avLst/></a:prstGeom><a:noFill/><a:ln><a:noFill/></a:ln></p:spPr><p:txBody><a:bodyPr spcFirstLastPara="1" wrap="square" lIns="34275" tIns="34275" rIns="34275" bIns="34275" anchor="ctr" anchorCtr="0"><a:noAutofit/></a:bodyPr><a:lstStyle><a:lvl1pPr marL="457200" marR="0" lvl="0" indent="-317500" algn="l"><a:lnSpc><a:spcPct val="100000"></a:spcPct></a:lnSpc><a:spcBef><a:spcPts val="2200"></a:spcPts></a:spcBef><a:spcAft><a:spcPts val="0"></a:spcPts></a:spcAft><a:buClr><a:srgbClr val="000000"></a:srgbClr></a:buClr><a:buSzPts val="1400"></a:buSzPts><a:buFont typeface="Helvetica Neue"></a:buFont><a:buChar char="•"></a:buChar><a:defRPr sz="1900" b="0" i="0" u="none" strike="noStrike" cap="none"><a:solidFill><a:srgbClr val="000000"></a:srgbClr></a:solidFill><a:latin typeface="Helvetica Neue"></a:latin><a:ea typeface="Helvetica Neue"></a:ea><a:cs typeface="Helvetica Neue"></a:cs></a:defRPr></a:lvl1pPr><a:lvl2pPr marL="914400" marR="0" lvl="1" indent="-317500" algn="l"><a:lnSpc><a:spcPct val="100000"></a:spcPct></a:lnSpc><a:spcBef><a:spcPts val="2200"></a:spcPts></a:spcBef><a:spcAft><a:spcPts val="0"></a:spcPts></a:spcAft><a:buClr><a:srgbClr val="000000"></a:srgbClr></a:buClr><a:buSzPts val="1400"></a:buSzPts><a:buFont typeface="Helvetica Neue"></a:buFont><a:buChar char="•"></a:buChar><a:defRPr sz="1900" b="0" i="0" u="none" strike="noStrike" cap="none"><a:solidFill><a:srgbClr val="000000"></a:srgbClr></a:solidFill><a:latin typeface="Helvetica Neue"></a:latin><a:ea typeface="Helvetica Neue"></a:ea><a:cs typeface="Helvetica Neue"></a:cs></a:defRPr></a:lvl2pPr><a:lvl3pPr marL="1371600" marR="0" lvl="2" indent="-317500" algn="l"><a:lnSpc><a:spcPct val="100000"></a:spcPct></a:lnSpc><a:spcBef><a:spcPts val="2200"></a:spcPts></a:spcBef><a:spcAft><a:spcPts val="0"></a:spcPts></a:spcAft><a:buClr><a:srgbClr val="000000"></a:srgbClr></a:buClr><a:buSzPts val="1400"></a:buSzPts><a:buFont typeface="Helvetica Neue"></a:buFont><a:buChar char="•"></a:buChar><a:defRPr sz="1900" b="0" i="0" u="none" strike="noStrike" cap="none"><a:solidFill><a:srgbClr val="000000"></a:srgbClr></a:solidFill><a:latin typeface="Helvetica Neue"></a:latin><a:ea typeface="Helvetica Neue"></a:ea><a:cs typeface="Helvetica Neue"></a:cs></a:defRPr></a:lvl3pPr><a:lvl4pPr marL="1828800" marR="0" lvl="3" indent="-317500" algn="l"><a:lnSpc><a:spcPct val="100000"></a:spcPct></a:lnSpc><a:spcBef><a:spcPts val="2200"></a:spcPts></a:spcBef><a:spcAft><a:spcPts val="0"></a:spcPts></a:spcAft><a:buClr><a:srgbClr val="000000"></a:srgbClr></a:buClr><a:buSzPts val="1400"></a:buSzPts><a:buFont typeface="Helvetica Neue"></a:buFont><a:buChar char="•"></a:buChar><a:defRPr sz="1900" b="0" i="0" u="none" strike="noStrike" cap="none"><a:solidFill><a:srgbClr val="000000"></a:srgbClr></a:solidFill><a:latin typeface="Helvetica Neue"></a:latin><a:ea typeface="Helvetica Neue"></a:ea><a:cs typeface="Helvetica Neue"></a:cs></a:defRPr></a:lvl4pPr><a:lvl5pPr marL="2286000" marR="0" lvl="4" indent="-317500" algn="l"><a:lnSpc><a:spcPct val="100000"></a:spcPct></a:lnSpc><a:spcBef><a:spcPts val="2200"></a:spcPts></a:spcBef><a:spcAft><a:spcPts val="0"></a:spcPts></a:spcAft><a:buClr><a:srgbClr val="000000"></a:srgbClr></a:buClr><a:buSzPts val="1400"></a:buSzPts><a:buFont typeface="Helvetica Neue"></a:buFont><a:buChar char="•"></a:buChar><a:defRPr sz="1900" b="0" i="0" u="none" strike="noStrike" cap="none"><a:solidFill><a:srgbClr val="000000"></a:srgbClr></a:solidFill><a:latin typeface="Helvetica Neue"></a:latin><a:ea typeface="Helvetica Neue"></a:ea><a:cs typeface="Helvetica Neue"></a:cs></a:defRPr></a:lvl5pPr><a:lvl6pPr marL="2743200" marR="0" lvl="5" indent="-317500" algn="l"><a:lnSpc><a:spcPct val="100000"></a:spcPct></a:lnSpc><a:spcBef><a:spcPts val="2200"></a:spcPts></a:spcBef><a:spcAft><a:spcPts val="0"></a:spcPts></a:spcAft><a:buClr><a:srgbClr val="000000"></a:srgbClr></a:buClr><a:buSzPts val="1400"></a:buSzPts><a:buFont typeface="Helvetica Neue"></a:buFont><a:buChar char="•"></a:buChar><a:defRPr sz="1900" b="0" i="0" u="none" strike="noStrike" cap="none"><a:solidFill><a:srgbClr val="000000"></a:srgbClr></a:solidFill><a:latin typeface="Helvetica Neue"></a:latin><a:ea typeface="Helvetica Neue"></a:ea><a:cs typeface="Helvetica Neue"></a:cs></a:defRPr></a:lvl6pPr><a:lvl7pPr marL="3200400" marR="0" lvl="6" indent="-317500" algn="l"><a:lnSpc><a:spcPct val="100000"></a:spcPct></a:lnSpc><a:spcBef><a:spcPts val="2200"></a:spcPts></a:spcBef><a:spcAft><a:spcPts val="0"></a:spcPts></a:spcAft><a:buClr><a:srgbClr val="000000"></a:srgbClr></a:buClr><a:buSzPts val="1400"></a:buSzPts><a:buFont typeface="Helvetica Neue"></a:buFont><a:buChar char="•"></a:buChar><a:defRPr sz="1900" b="0" i="0" u="none" strike="noStrike" cap="none"><a:solidFill><a:srgbClr val="000000"></a:srgbClr></a:solidFill><a:latin typeface="Helvetica Neue"></a:latin><a:ea typeface="Helvetica Neue"></a:ea><a:cs typeface="Helvetica Neue"></a:cs></a:defRPr></a:lvl7pPr><a:lvl8pPr marL="3657600" marR="0" lvl="7" indent="-317500" algn="l"><a:lnSpc><a:spcPct val="100000"></a:spcPct></a:lnSpc><a:spcBef><a:spcPts val="2200"></a:spcPts></a:spcBef><a:spcAft><a:spcPts val="0"></a:spcPts></a:spcAft><a:buClr><a:srgbClr val="000000"></a:srgbClr></a:buClr><a:buSzPts val="1400"></a:buSzPts><a:buFont typeface="Helvetica Neue"></a:buFont><a:buChar char="•"></a:buChar><a:defRPr sz="1900" b="0" i="0" u="none" strike="noStrike" cap="none"><a:solidFill><a:srgbClr val="000000"></a:srgbClr></a:solidFill><a:latin typeface="Helvetica Neue"></a:latin><a:ea typeface="Helvetica Neue"></a:ea><a:cs typeface="Helvetica Neue"></a:cs></a:defRPr></a:lvl8pPr><a:lvl9pPr marL="4114800" marR="0" lvl="8" indent="-317500" algn="l"><a:lnSpc><a:spcPct val="100000"></a:spcPct></a:lnSpc><a:spcBef><a:spcPts val="2200"></a:spcPts></a:spcBef><a:spcAft><a:spcPts val="0"></a:spcPts></a:spcAft><a:buClr><a:srgbClr val="000000"></a:srgbClr></a:buClr><a:buSzPts val="1400"></a:buSzPts><a:buFont typeface="Helvetica Neue"></a:buFont><a:buChar char="•"></a:buChar><a:defRPr sz="1900" b="0" i="0" u="none" strike="noStrike" cap="none"><a:solidFill><a:srgbClr val="000000"></a:srgbClr></a:solidFill><a:latin typeface="Helvetica Neue"></a:latin><a:ea typeface="Helvetica Neue"></a:ea><a:cs typeface="Helvetica Neue"></a:cs></a:defRPr></a:lvl9pPr></a:lstStyle><a:p><a:pPr><a:defRPr></a:defRPr></a:pPr><a:endParaRPr></a:endParaRPr></a:p></p:txBody></p:sp><p:sp><p:nvSpPr><p:cNvPr id="146" name="Google Shape;146;p43"></p:cNvPr><p:cNvSpPr txBox="1"></p:cNvSpPr><p:nvPr><p:ph type="sldNum" idx="12"></p:ph></p:nvPr></p:nvSpPr><p:spPr bwMode="auto"><a:xfrm><a:off x="3804541" y="9541073"></a:off><a:ext cx="157500" cy="375000"></a:ext></a:xfrm><a:prstGeom prst="rect"><a:avLst/></a:prstGeom><a:noFill/><a:ln><a:noFill/></a:ln></p:spPr><p:txBody><a:bodyPr spcFirstLastPara="1" wrap="square" lIns="26775" tIns="26775" rIns="26775" bIns="26775" anchor="t" anchorCtr="0"><a:noAutofit/></a:bodyPr><a:lstStyle><a:lvl1pPr marL="0" marR="0" lvl="0" indent="0" algn="ctr"><a:lnSpc><a:spcPct val="100000"></a:spcPct></a:lnSpc><a:spcBef><a:spcPts val="0"></a:spcPts></a:spcBef><a:spcAft><a:spcPts val="0"></a:spcPts></a:spcAft><a:buClr><a:srgbClr val="000000"></a:srgbClr></a:buClr><a:buFont typeface="Helvetica Neue"></a:buFont><a:buNone/><a:defRPr sz="900" b="0" i="0" u="none" strike="noStrike" cap="none"><a:solidFill><a:srgbClr val="000000"></a:srgbClr></a:solidFill><a:latin typeface="Helvetica Neue"></a:latin><a:ea typeface="Helvetica Neue"></a:ea><a:cs typeface="Helvetica Neue"></a:cs></a:defRPr></a:lvl1pPr><a:lvl2pPr marL="0" marR="0" lvl="1" indent="0" algn="ctr"><a:lnSpc><a:spcPct val="100000"></a:spcPct></a:lnSpc><a:spcBef><a:spcPts val="0"></a:spcPts></a:spcBef><a:spcAft><a:spcPts val="0"></a:spcPts></a:spcAft><a:buClr><a:srgbClr val="000000"></a:srgbClr></a:buClr><a:buFont typeface="Helvetica Neue"></a:buFont><a:buNone/><a:defRPr sz="900" b="0" i="0" u="none" strike="noStrike" cap="none"><a:solidFill><a:srgbClr val="000000"></a:srgbClr></a:solidFill><a:latin typeface="Helvetica Neue"></a:latin><a:ea typeface="Helvetica Neue"></a:ea><a:cs typeface="Helvetica Neue"></a:cs></a:defRPr></a:lvl2pPr><a:lvl3pPr marL="0" marR="0" lvl="2" indent="0" algn="ctr"><a:lnSpc><a:spcPct val="100000"></a:spcPct></a:lnSpc><a:spcBef><a:spcPts val="0"></a:spcPts></a:spcBef><a:spcAft><a:spcPts val="0"></a:spcPts></a:spcAft><a:buClr><a:srgbClr val="000000"></a:srgbClr></a:buClr><a:buFont typeface="Helvetica Neue"></a:buFont><a:buNone/><a:defRPr sz="900" b="0" i="0" u="none" strike="noStrike" cap="none"><a:solidFill><a:srgbClr val="000000"></a:srgbClr></a:solidFill><a:latin typeface="Helvetica Neue"></a:latin><a:ea typeface="Helvetica Neue"></a:ea><a:cs typeface="Helvetica Neue"></a:cs></a:defRPr></a:lvl3pPr><a:lvl4pPr marL="0" marR="0" lvl="3" indent="0" algn="ctr"><a:lnSpc><a:spcPct val="100000"></a:spcPct></a:lnSpc><a:spcBef><a:spcPts val="0"></a:spcPts></a:spcBef><a:spcAft><a:spcPts val="0"></a:spcPts></a:spcAft><a:buClr><a:srgbClr val="000000"></a:srgbClr></a:buClr><a:buFont typeface="Helvetica Neue"></a:buFont><a:buNone/><a:defRPr sz="900" b="0" i="0" u="none" strike="noStrike" cap="none"><a:solidFill><a:srgbClr val="000000"></a:srgbClr></a:solidFill><a:latin typeface="Helvetica Neue"></a:latin><a:ea typeface="Helvetica Neue"></a:ea><a:cs typeface="Helvetica Neue"></a:cs></a:defRPr></a:lvl4pPr><a:lvl5pPr marL="0" marR="0" lvl="4" indent="0" algn="ctr"><a:lnSpc><a:spcPct val="100000"></a:spcPct></a:lnSpc><a:spcBef><a:spcPts val="0"></a:spcPts></a:spcBef><a:spcAft><a:spcPts val="0"></a:spcPts></a:spcAft><a:buClr><a:srgbClr val="000000"></a:srgbClr></a:buClr><a:buFont typeface="Helvetica Neue"></a:buFont><a:buNone/><a:defRPr sz="900" b="0" i="0" u="none" strike="noStrike" cap="none"><a:solidFill><a:srgbClr val="000000"></a:srgbClr></a:solidFill><a:latin typeface="Helvetica Neue"></a:latin><a:ea typeface="Helvetica Neue"></a:ea><a:cs typeface="Helvetica Neue"></a:cs></a:defRPr></a:lvl5pPr><a:lvl6pPr marL="0" marR="0" lvl="5" indent="0" algn="ctr"><a:lnSpc><a:spcPct val="100000"></a:spcPct></a:lnSpc><a:spcBef><a:spcPts val="0"></a:spcPts></a:spcBef><a:spcAft><a:spcPts val="0"></a:spcPts></a:spcAft><a:buClr><a:srgbClr val="000000"></a:srgbClr></a:buClr><a:buFont typeface="Helvetica Neue"></a:buFont><a:buNone/><a:defRPr sz="900" b="0" i="0" u="none" strike="noStrike" cap="none"><a:solidFill><a:srgbClr val="000000"></a:srgbClr></a:solidFill><a:latin typeface="Helvetica Neue"></a:latin><a:ea typeface="Helvetica Neue"></a:ea><a:cs typeface="Helvetica Neue"></a:cs></a:defRPr></a:lvl6pPr><a:lvl7pPr marL="0" marR="0" lvl="6" indent="0" algn="ctr"><a:lnSpc><a:spcPct val="100000"></a:spcPct></a:lnSpc><a:spcBef><a:spcPts val="0"></a:spcPts></a:spcBef><a:spcAft><a:spcPts val="0"></a:spcPts></a:spcAft><a:buClr><a:srgbClr val="000000"></a:srgbClr></a:buClr><a:buFont typeface="Helvetica Neue"></a:buFont><a:buNone/><a:defRPr sz="900" b="0" i="0" u="none" strike="noStrike" cap="none"><a:solidFill><a:srgbClr val="000000"></a:srgbClr></a:solidFill><a:latin typeface="Helvetica Neue"></a:latin><a:ea typeface="Helvetica Neue"></a:ea><a:cs typeface="Helvetica Neue"></a:cs></a:defRPr></a:lvl7pPr><a:lvl8pPr marL="0" marR="0" lvl="7" indent="0" algn="ctr"><a:lnSpc><a:spcPct val="100000"></a:spcPct></a:lnSpc><a:spcBef><a:spcPts val="0"></a:spcPts></a:spcBef><a:spcAft><a:spcPts val="0"></a:spcPts></a:spcAft><a:buClr><a:srgbClr val="000000"></a:srgbClr></a:buClr><a:buFont typeface="Helvetica Neue"></a:buFont><a:buNone/><a:defRPr sz="900" b="0" i="0" u="none" strike="noStrike" cap="none"><a:solidFill><a:srgbClr val="000000"></a:srgbClr></a:solidFill><a:latin typeface="Helvetica Neue"></a:latin><a:ea typeface="Helvetica Neue"></a:ea><a:cs typeface="Helvetica Neue"></a:cs></a:defRPr></a:lvl8pPr><a:lvl9pPr marL="0" marR="0" lvl="8" indent="0" algn="ctr"><a:lnSpc><a:spcPct val="100000"></a:spcPct></a:lnSpc><a:spcBef><a:spcPts val="0"></a:spcPts></a:spcBef><a:spcAft><a:spcPts val="0"></a:spcPts></a:spcAft><a:buClr><a:srgbClr val="000000"></a:srgbClr></a:buClr><a:buFont typeface="Helvetica Neue"></a:buFont><a:buNone/><a:defRPr sz="900" b="0" i="0" u="none" strike="noStrike" cap="none"><a:solidFill><a:srgbClr val="000000"></a:srgbClr></a:solidFill><a:latin typeface="Helvetica Neue"></a:latin><a:ea typeface="Helvetica Neue"></a:ea><a:cs typeface="Helvetica Neue"></a:cs></a:defRPr></a:lvl9pPr></a:lstStyle><a:p><a:pPr marL="0" lvl="0" indent="0" algn="ctr"><a:spcBef><a:spcPts val="0"></a:spcPts></a:spcBef><a:spcAft><a:spcPts val="0"></a:spcPts></a:spcAft><a:buNone/><a:defRPr></a:defRPr></a:pPr><a:fld id="{00000000-1234-1234-1234-123412341234}" type="slidenum"><a:rPr lang="en"></a:rPr><a:t></a:t></a:fld><a:endParaRPr></a:endParaRPr></a:p></p:txBody></p:sp></p:spTree></p:cSld><p:clrMapOvr><a:masterClrMapping/></p:clrMapOvr></p:sldLayout>
+<file path=ppt/slideLayouts/slideLayout28.xml><?xml version="1.0" encoding="utf-8"?>
+<p:sldLayout xmlns:a="http://schemas.openxmlformats.org/drawingml/2006/main" xmlns:r="http://schemas.openxmlformats.org/officeDocument/2006/relationships" xmlns:p="http://schemas.openxmlformats.org/presentationml/2006/main" xmlns:m="http://schemas.openxmlformats.org/officeDocument/2006/math" xmlns:w="http://schemas.openxmlformats.org/wordprocessingml/2006/main" matchingName="" preserve="0" showMasterPhAnim="0" userDrawn="1">
+  <p:cSld name="">
+    <p:spTree>
+      <p:nvGrpSpPr>
+        <p:cNvPr id="1" name=""/>
+        <p:cNvGrpSpPr/>
+        <p:nvPr/>
+      </p:nvGrpSpPr>
+      <p:grpSpPr bwMode="auto">
+        <a:xfrm>
+          <a:off x="0" y="0"/>
+          <a:ext cx="0" cy="0"/>
+          <a:chOff x="0" y="0"/>
+          <a:chExt cx="0" cy="0"/>
+        </a:xfrm>
+      </p:grpSpPr>
+    </p:spTree>
+  </p:cSld>
+  <p:clrMapOvr>
+    <a:masterClrMapping/>
+  </p:clrMapOvr>
+</p:sldLayout>
 </file>
 
-<file path=ppt/slideLayouts/slideLayout29.xml><?xml version="1.0" encoding="UTF-8" standalone="yes"?><p:sldLayout xmlns:a="http://schemas.openxmlformats.org/drawingml/2006/main" xmlns:r="http://schemas.openxmlformats.org/officeDocument/2006/relationships" xmlns:p="http://schemas.openxmlformats.org/presentationml/2006/main" xmlns:m="http://schemas.openxmlformats.org/officeDocument/2006/math" xmlns:w="http://schemas.openxmlformats.org/wordprocessingml/2006/main" matchingName="Title, Bullets & Photo" preserve="0" showMasterPhAnim="0" userDrawn="1"><p:cSld name="Title, Bullets &amp; Photo"><p:spTree><p:nvGrpSpPr><p:cNvPr id="1" name=""></p:cNvPr><p:cNvGrpSpPr/><p:nvPr></p:nvPr></p:nvGrpSpPr><p:grpSpPr bwMode="auto"><a:xfrm><a:off x="0" y="0"></a:off><a:ext cx="0" cy="0"></a:ext><a:chOff x="0" y="0"></a:chOff><a:chExt cx="0" cy="0"></a:chExt></a:xfrm></p:grpSpPr><p:sp><p:nvSpPr><p:cNvPr id="148" name="Google Shape;148;p44"></p:cNvPr><p:cNvSpPr></p:cNvSpPr><p:nvPr><p:ph type="pic" idx="2"></p:ph></p:nvPr></p:nvSpPr><p:spPr bwMode="auto"><a:xfrm><a:off x="3982975" y="2684858"></a:off><a:ext cx="2391000" cy="6482700"></a:ext></a:xfrm><a:prstGeom prst="rect"><a:avLst/></a:prstGeom><a:noFill/><a:ln><a:noFill/></a:ln></p:spPr><p:txBody><a:bodyPr spcFirstLastPara="1" wrap="square" lIns="34275" tIns="34275" rIns="34275" bIns="34275" anchor="t" anchorCtr="0"><a:noAutofit/></a:bodyPr><a:lstStyle><a:lvl1pPr marL="228600" marR="0" lvl="0" indent="-228600" algn="l"><a:lnSpc><a:spcPct val="100000"></a:spcPct></a:lnSpc><a:spcBef><a:spcPts val="2200"></a:spcPts></a:spcBef><a:spcAft><a:spcPts val="0"></a:spcPts></a:spcAft><a:buClr><a:srgbClr val="000000"></a:srgbClr></a:buClr><a:buSzPts val="1400"></a:buSzPts><a:buFont typeface="Helvetica Neue"></a:buFont><a:buChar char="•"></a:buChar><a:defRPr sz="1900" b="0" i="0" u="none" strike="noStrike" cap="none"><a:solidFill><a:srgbClr val="000000"></a:srgbClr></a:solidFill><a:latin typeface="Helvetica Neue"></a:latin><a:ea typeface="Helvetica Neue"></a:ea><a:cs typeface="Helvetica Neue"></a:cs></a:defRPr></a:lvl1pPr><a:lvl2pPr marL="393700" marR="0" lvl="1" indent="-228600" algn="l"><a:lnSpc><a:spcPct val="100000"></a:spcPct></a:lnSpc><a:spcBef><a:spcPts val="2200"></a:spcPts></a:spcBef><a:spcAft><a:spcPts val="0"></a:spcPts></a:spcAft><a:buClr><a:srgbClr val="000000"></a:srgbClr></a:buClr><a:buSzPts val="1400"></a:buSzPts><a:buFont typeface="Helvetica Neue"></a:buFont><a:buChar char="•"></a:buChar><a:defRPr sz="1900" b="0" i="0" u="none" strike="noStrike" cap="none"><a:solidFill><a:srgbClr val="000000"></a:srgbClr></a:solidFill><a:latin typeface="Helvetica Neue"></a:latin><a:ea typeface="Helvetica Neue"></a:ea><a:cs typeface="Helvetica Neue"></a:cs></a:defRPr></a:lvl2pPr><a:lvl3pPr marL="558800" marR="0" lvl="2" indent="-228600" algn="l"><a:lnSpc><a:spcPct val="100000"></a:spcPct></a:lnSpc><a:spcBef><a:spcPts val="2200"></a:spcPts></a:spcBef><a:spcAft><a:spcPts val="0"></a:spcPts></a:spcAft><a:buClr><a:srgbClr val="000000"></a:srgbClr></a:buClr><a:buSzPts val="1400"></a:buSzPts><a:buFont typeface="Helvetica Neue"></a:buFont><a:buChar char="•"></a:buChar><a:defRPr sz="1900" b="0" i="0" u="none" strike="noStrike" cap="none"><a:solidFill><a:srgbClr val="000000"></a:srgbClr></a:solidFill><a:latin typeface="Helvetica Neue"></a:latin><a:ea typeface="Helvetica Neue"></a:ea><a:cs typeface="Helvetica Neue"></a:cs></a:defRPr></a:lvl3pPr><a:lvl4pPr marL="736600" marR="0" lvl="3" indent="-241300" algn="l"><a:lnSpc><a:spcPct val="100000"></a:spcPct></a:lnSpc><a:spcBef><a:spcPts val="2200"></a:spcPts></a:spcBef><a:spcAft><a:spcPts val="0"></a:spcPts></a:spcAft><a:buClr><a:srgbClr val="000000"></a:srgbClr></a:buClr><a:buSzPts val="1400"></a:buSzPts><a:buFont typeface="Helvetica Neue"></a:buFont><a:buChar char="•"></a:buChar><a:defRPr sz="1900" b="0" i="0" u="none" strike="noStrike" cap="none"><a:solidFill><a:srgbClr val="000000"></a:srgbClr></a:solidFill><a:latin typeface="Helvetica Neue"></a:latin><a:ea typeface="Helvetica Neue"></a:ea><a:cs typeface="Helvetica Neue"></a:cs></a:defRPr></a:lvl4pPr><a:lvl5pPr marL="901700" marR="0" lvl="4" indent="-228600" algn="l"><a:lnSpc><a:spcPct val="100000"></a:spcPct></a:lnSpc><a:spcBef><a:spcPts val="2200"></a:spcPts></a:spcBef><a:spcAft><a:spcPts val="0"></a:spcPts></a:spcAft><a:buClr><a:srgbClr val="000000"></a:srgbClr></a:buClr><a:buSzPts val="1400"></a:buSzPts><a:buFont typeface="Helvetica Neue"></a:buFont><a:buChar char="•"></a:buChar><a:defRPr sz="1900" b="0" i="0" u="none" strike="noStrike" cap="none"><a:solidFill><a:srgbClr val="000000"></a:srgbClr></a:solidFill><a:latin typeface="Helvetica Neue"></a:latin><a:ea typeface="Helvetica Neue"></a:ea><a:cs typeface="Helvetica Neue"></a:cs></a:defRPr></a:lvl5pPr><a:lvl6pPr marL="1066800" marR="0" lvl="5" indent="-228600" algn="l"><a:lnSpc><a:spcPct val="100000"></a:spcPct></a:lnSpc><a:spcBef><a:spcPts val="2200"></a:spcPts></a:spcBef><a:spcAft><a:spcPts val="0"></a:spcPts></a:spcAft><a:buClr><a:srgbClr val="000000"></a:srgbClr></a:buClr><a:buSzPts val="1400"></a:buSzPts><a:buFont typeface="Helvetica Neue"></a:buFont><a:buChar char="•"></a:buChar><a:defRPr sz="1900" b="0" i="0" u="none" strike="noStrike" cap="none"><a:solidFill><a:srgbClr val="000000"></a:srgbClr></a:solidFill><a:latin typeface="Helvetica Neue"></a:latin><a:ea typeface="Helvetica Neue"></a:ea><a:cs typeface="Helvetica Neue"></a:cs></a:defRPr></a:lvl6pPr><a:lvl7pPr marL="1231900" marR="0" lvl="6" indent="-228600" algn="l"><a:lnSpc><a:spcPct val="100000"></a:spcPct></a:lnSpc><a:spcBef><a:spcPts val="2200"></a:spcPts></a:spcBef><a:spcAft><a:spcPts val="0"></a:spcPts></a:spcAft><a:buClr><a:srgbClr val="000000"></a:srgbClr></a:buClr><a:buSzPts val="1400"></a:buSzPts><a:buFont typeface="Helvetica Neue"></a:buFont><a:buChar char="•"></a:buChar><a:defRPr sz="1900" b="0" i="0" u="none" strike="noStrike" cap="none"><a:solidFill><a:srgbClr val="000000"></a:srgbClr></a:solidFill><a:latin typeface="Helvetica Neue"></a:latin><a:ea typeface="Helvetica Neue"></a:ea><a:cs typeface="Helvetica Neue"></a:cs></a:defRPr></a:lvl7pPr><a:lvl8pPr marL="1397000" marR="0" lvl="7" indent="-228600" algn="l"><a:lnSpc><a:spcPct val="100000"></a:spcPct></a:lnSpc><a:spcBef><a:spcPts val="2200"></a:spcPts></a:spcBef><a:spcAft><a:spcPts val="0"></a:spcPts></a:spcAft><a:buClr><a:srgbClr val="000000"></a:srgbClr></a:buClr><a:buSzPts val="1400"></a:buSzPts><a:buFont typeface="Helvetica Neue"></a:buFont><a:buChar char="•"></a:buChar><a:defRPr sz="1900" b="0" i="0" u="none" strike="noStrike" cap="none"><a:solidFill><a:srgbClr val="000000"></a:srgbClr></a:solidFill><a:latin typeface="Helvetica Neue"></a:latin><a:ea typeface="Helvetica Neue"></a:ea><a:cs typeface="Helvetica Neue"></a:cs></a:defRPr></a:lvl8pPr><a:lvl9pPr marL="1562100" marR="0" lvl="8" indent="-228600" algn="l"><a:lnSpc><a:spcPct val="100000"></a:spcPct></a:lnSpc><a:spcBef><a:spcPts val="2200"></a:spcPts></a:spcBef><a:spcAft><a:spcPts val="0"></a:spcPts></a:spcAft><a:buClr><a:srgbClr val="000000"></a:srgbClr></a:buClr><a:buSzPts val="1400"></a:buSzPts><a:buFont typeface="Helvetica Neue"></a:buFont><a:buChar char="•"></a:buChar><a:defRPr sz="1900" b="0" i="0" u="none" strike="noStrike" cap="none"><a:solidFill><a:srgbClr val="000000"></a:srgbClr></a:solidFill><a:latin typeface="Helvetica Neue"></a:latin><a:ea typeface="Helvetica Neue"></a:ea><a:cs typeface="Helvetica Neue"></a:cs></a:defRPr></a:lvl9pPr></a:lstStyle><a:p><a:pPr><a:defRPr></a:defRPr></a:pPr><a:endParaRPr></a:endParaRPr></a:p></p:txBody></p:sp><p:sp><p:nvSpPr><p:cNvPr id="149" name="Google Shape;149;p44"></p:cNvPr><p:cNvSpPr txBox="1"></p:cNvSpPr><p:nvPr><p:ph type="title"></p:ph></p:nvPr></p:nvSpPr><p:spPr bwMode="auto"><a:xfrm><a:off x="1398501" y="458391"></a:off><a:ext cx="4975200" cy="2226300"></a:ext></a:xfrm><a:prstGeom prst="rect"><a:avLst/></a:prstGeom><a:noFill/><a:ln><a:noFill/></a:ln></p:spPr><p:txBody><a:bodyPr spcFirstLastPara="1" wrap="square" lIns="34275" tIns="34275" rIns="34275" bIns="34275" anchor="ctr" anchorCtr="0"><a:noAutofit/></a:bodyPr><a:lstStyle><a:lvl1pPr marL="0" marR="0" lvl="0" indent="0" algn="ctr"><a:lnSpc><a:spcPct val="100000"></a:spcPct></a:lnSpc><a:spcBef><a:spcPts val="0"></a:spcPts></a:spcBef><a:spcAft><a:spcPts val="0"></a:spcPts></a:spcAft><a:buClr><a:srgbClr val="000000"></a:srgbClr></a:buClr><a:buSzPts val="500"></a:buSzPts><a:buFont typeface="Helvetica Neue"></a:buFont><a:buNone/><a:defRPr sz="4200" b="0" i="0" u="none" strike="noStrike" cap="none"><a:solidFill><a:srgbClr val="000000"></a:srgbClr></a:solidFill><a:latin typeface="Helvetica Neue"></a:latin><a:ea typeface="Helvetica Neue"></a:ea><a:cs typeface="Helvetica Neue"></a:cs></a:defRPr></a:lvl1pPr><a:lvl2pPr marL="0" marR="0" lvl="1" indent="88900" algn="ctr"><a:lnSpc><a:spcPct val="100000"></a:spcPct></a:lnSpc><a:spcBef><a:spcPts val="0"></a:spcPts></a:spcBef><a:spcAft><a:spcPts val="0"></a:spcPts></a:spcAft><a:buClr><a:srgbClr val="000000"></a:srgbClr></a:buClr><a:buSzPts val="500"></a:buSzPts><a:buFont typeface="Helvetica Neue"></a:buFont><a:buNone/><a:defRPr sz="4200" b="0" i="0" u="none" strike="noStrike" cap="none"><a:solidFill><a:srgbClr val="000000"></a:srgbClr></a:solidFill><a:latin typeface="Helvetica Neue"></a:latin><a:ea typeface="Helvetica Neue"></a:ea><a:cs typeface="Helvetica Neue"></a:cs></a:defRPr></a:lvl2pPr><a:lvl3pPr marL="0" marR="0" lvl="2" indent="177800" algn="ctr"><a:lnSpc><a:spcPct val="100000"></a:spcPct></a:lnSpc><a:spcBef><a:spcPts val="0"></a:spcPts></a:spcBef><a:spcAft><a:spcPts val="0"></a:spcPts></a:spcAft><a:buClr><a:srgbClr val="000000"></a:srgbClr></a:buClr><a:buSzPts val="500"></a:buSzPts><a:buFont typeface="Helvetica Neue"></a:buFont><a:buNone/><a:defRPr sz="4200" b="0" i="0" u="none" strike="noStrike" cap="none"><a:solidFill><a:srgbClr val="000000"></a:srgbClr></a:solidFill><a:latin typeface="Helvetica Neue"></a:latin><a:ea typeface="Helvetica Neue"></a:ea><a:cs typeface="Helvetica Neue"></a:cs></a:defRPr></a:lvl3pPr><a:lvl4pPr marL="0" marR="0" lvl="3" indent="254000" algn="ctr"><a:lnSpc><a:spcPct val="100000"></a:spcPct></a:lnSpc><a:spcBef><a:spcPts val="0"></a:spcPts></a:spcBef><a:spcAft><a:spcPts val="0"></a:spcPts></a:spcAft><a:buClr><a:srgbClr val="000000"></a:srgbClr></a:buClr><a:buSzPts val="500"></a:buSzPts><a:buFont typeface="Helvetica Neue"></a:buFont><a:buNone/><a:defRPr sz="4200" b="0" i="0" u="none" strike="noStrike" cap="none"><a:solidFill><a:srgbClr val="000000"></a:srgbClr></a:solidFill><a:latin typeface="Helvetica Neue"></a:latin><a:ea typeface="Helvetica Neue"></a:ea><a:cs typeface="Helvetica Neue"></a:cs></a:defRPr></a:lvl4pPr><a:lvl5pPr marL="0" marR="0" lvl="4" indent="342900" algn="ctr"><a:lnSpc><a:spcPct val="100000"></a:spcPct></a:lnSpc><a:spcBef><a:spcPts val="0"></a:spcPts></a:spcBef><a:spcAft><a:spcPts val="0"></a:spcPts></a:spcAft><a:buClr><a:srgbClr val="000000"></a:srgbClr></a:buClr><a:buSzPts val="500"></a:buSzPts><a:buFont typeface="Helvetica Neue"></a:buFont><a:buNone/><a:defRPr sz="4200" b="0" i="0" u="none" strike="noStrike" cap="none"><a:solidFill><a:srgbClr val="000000"></a:srgbClr></a:solidFill><a:latin typeface="Helvetica Neue"></a:latin><a:ea typeface="Helvetica Neue"></a:ea><a:cs typeface="Helvetica Neue"></a:cs></a:defRPr></a:lvl5pPr><a:lvl6pPr marL="0" marR="0" lvl="5" indent="431799" algn="ctr"><a:lnSpc><a:spcPct val="100000"></a:spcPct></a:lnSpc><a:spcBef><a:spcPts val="0"></a:spcPts></a:spcBef><a:spcAft><a:spcPts val="0"></a:spcPts></a:spcAft><a:buClr><a:srgbClr val="000000"></a:srgbClr></a:buClr><a:buSzPts val="500"></a:buSzPts><a:buFont typeface="Helvetica Neue"></a:buFont><a:buNone/><a:defRPr sz="4200" b="0" i="0" u="none" strike="noStrike" cap="none"><a:solidFill><a:srgbClr val="000000"></a:srgbClr></a:solidFill><a:latin typeface="Helvetica Neue"></a:latin><a:ea typeface="Helvetica Neue"></a:ea><a:cs typeface="Helvetica Neue"></a:cs></a:defRPr></a:lvl6pPr><a:lvl7pPr marL="0" marR="0" lvl="6" indent="520700" algn="ctr"><a:lnSpc><a:spcPct val="100000"></a:spcPct></a:lnSpc><a:spcBef><a:spcPts val="0"></a:spcPts></a:spcBef><a:spcAft><a:spcPts val="0"></a:spcPts></a:spcAft><a:buClr><a:srgbClr val="000000"></a:srgbClr></a:buClr><a:buSzPts val="500"></a:buSzPts><a:buFont typeface="Helvetica Neue"></a:buFont><a:buNone/><a:defRPr sz="4200" b="0" i="0" u="none" strike="noStrike" cap="none"><a:solidFill><a:srgbClr val="000000"></a:srgbClr></a:solidFill><a:latin typeface="Helvetica Neue"></a:latin><a:ea typeface="Helvetica Neue"></a:ea><a:cs typeface="Helvetica Neue"></a:cs></a:defRPr></a:lvl7pPr><a:lvl8pPr marL="0" marR="0" lvl="7" indent="596900" algn="ctr"><a:lnSpc><a:spcPct val="100000"></a:spcPct></a:lnSpc><a:spcBef><a:spcPts val="0"></a:spcPts></a:spcBef><a:spcAft><a:spcPts val="0"></a:spcPts></a:spcAft><a:buClr><a:srgbClr val="000000"></a:srgbClr></a:buClr><a:buSzPts val="500"></a:buSzPts><a:buFont typeface="Helvetica Neue"></a:buFont><a:buNone/><a:defRPr sz="4200" b="0" i="0" u="none" strike="noStrike" cap="none"><a:solidFill><a:srgbClr val="000000"></a:srgbClr></a:solidFill><a:latin typeface="Helvetica Neue"></a:latin><a:ea typeface="Helvetica Neue"></a:ea><a:cs typeface="Helvetica Neue"></a:cs></a:defRPr></a:lvl8pPr><a:lvl9pPr marL="0" marR="0" lvl="8" indent="685800" algn="ctr"><a:lnSpc><a:spcPct val="100000"></a:spcPct></a:lnSpc><a:spcBef><a:spcPts val="0"></a:spcPts></a:spcBef><a:spcAft><a:spcPts val="0"></a:spcPts></a:spcAft><a:buClr><a:srgbClr val="000000"></a:srgbClr></a:buClr><a:buSzPts val="500"></a:buSzPts><a:buFont typeface="Helvetica Neue"></a:buFont><a:buNone/><a:defRPr sz="4200" b="0" i="0" u="none" strike="noStrike" cap="none"><a:solidFill><a:srgbClr val="000000"></a:srgbClr></a:solidFill><a:latin typeface="Helvetica Neue"></a:latin><a:ea typeface="Helvetica Neue"></a:ea><a:cs typeface="Helvetica Neue"></a:cs></a:defRPr></a:lvl9pPr></a:lstStyle><a:p><a:pPr><a:defRPr></a:defRPr></a:pPr><a:endParaRPr></a:endParaRPr></a:p></p:txBody></p:sp><p:sp><p:nvSpPr><p:cNvPr id="150" name="Google Shape;150;p44"></p:cNvPr><p:cNvSpPr txBox="1"></p:cNvSpPr><p:nvPr><p:ph type="body" idx="1"></p:ph></p:nvPr></p:nvSpPr><p:spPr bwMode="auto"><a:xfrm><a:off x="1398501" y="2684858"></a:off><a:ext cx="2391000" cy="6482700"></a:ext></a:xfrm><a:prstGeom prst="rect"><a:avLst/></a:prstGeom><a:noFill/><a:ln><a:noFill/></a:ln></p:spPr><p:txBody><a:bodyPr spcFirstLastPara="1" wrap="square" lIns="34275" tIns="34275" rIns="34275" bIns="34275" anchor="ctr" anchorCtr="0"><a:noAutofit/></a:bodyPr><a:lstStyle><a:lvl1pPr marL="457200" marR="0" lvl="0" indent="-298450" algn="l"><a:lnSpc><a:spcPct val="100000"></a:spcPct></a:lnSpc><a:spcBef><a:spcPts val="1700"></a:spcPts></a:spcBef><a:spcAft><a:spcPts val="0"></a:spcPts></a:spcAft><a:buClr><a:srgbClr val="000000"></a:srgbClr></a:buClr><a:buSzPts val="1100"></a:buSzPts><a:buFont typeface="Helvetica Neue"></a:buFont><a:buChar char="•"></a:buChar><a:defRPr sz="1400" b="0" i="0" u="none" strike="noStrike" cap="none"><a:solidFill><a:srgbClr val="000000"></a:srgbClr></a:solidFill><a:latin typeface="Helvetica Neue"></a:latin><a:ea typeface="Helvetica Neue"></a:ea><a:cs typeface="Helvetica Neue"></a:cs></a:defRPr></a:lvl1pPr><a:lvl2pPr marL="914400" marR="0" lvl="1" indent="-298450" algn="l"><a:lnSpc><a:spcPct val="100000"></a:spcPct></a:lnSpc><a:spcBef><a:spcPts val="1700"></a:spcPts></a:spcBef><a:spcAft><a:spcPts val="0"></a:spcPts></a:spcAft><a:buClr><a:srgbClr val="000000"></a:srgbClr></a:buClr><a:buSzPts val="1100"></a:buSzPts><a:buFont typeface="Helvetica Neue"></a:buFont><a:buChar char="•"></a:buChar><a:defRPr sz="1400" b="0" i="0" u="none" strike="noStrike" cap="none"><a:solidFill><a:srgbClr val="000000"></a:srgbClr></a:solidFill><a:latin typeface="Helvetica Neue"></a:latin><a:ea typeface="Helvetica Neue"></a:ea><a:cs typeface="Helvetica Neue"></a:cs></a:defRPr></a:lvl2pPr><a:lvl3pPr marL="1371600" marR="0" lvl="2" indent="-298450" algn="l"><a:lnSpc><a:spcPct val="100000"></a:spcPct></a:lnSpc><a:spcBef><a:spcPts val="1700"></a:spcPts></a:spcBef><a:spcAft><a:spcPts val="0"></a:spcPts></a:spcAft><a:buClr><a:srgbClr val="000000"></a:srgbClr></a:buClr><a:buSzPts val="1100"></a:buSzPts><a:buFont typeface="Helvetica Neue"></a:buFont><a:buChar char="•"></a:buChar><a:defRPr sz="1400" b="0" i="0" u="none" strike="noStrike" cap="none"><a:solidFill><a:srgbClr val="000000"></a:srgbClr></a:solidFill><a:latin typeface="Helvetica Neue"></a:latin><a:ea typeface="Helvetica Neue"></a:ea><a:cs typeface="Helvetica Neue"></a:cs></a:defRPr></a:lvl3pPr><a:lvl4pPr marL="1828800" marR="0" lvl="3" indent="-298450" algn="l"><a:lnSpc><a:spcPct val="100000"></a:spcPct></a:lnSpc><a:spcBef><a:spcPts val="1700"></a:spcPts></a:spcBef><a:spcAft><a:spcPts val="0"></a:spcPts></a:spcAft><a:buClr><a:srgbClr val="000000"></a:srgbClr></a:buClr><a:buSzPts val="1100"></a:buSzPts><a:buFont typeface="Helvetica Neue"></a:buFont><a:buChar char="•"></a:buChar><a:defRPr sz="1400" b="0" i="0" u="none" strike="noStrike" cap="none"><a:solidFill><a:srgbClr val="000000"></a:srgbClr></a:solidFill><a:latin typeface="Helvetica Neue"></a:latin><a:ea typeface="Helvetica Neue"></a:ea><a:cs typeface="Helvetica Neue"></a:cs></a:defRPr></a:lvl4pPr><a:lvl5pPr marL="2286000" marR="0" lvl="4" indent="-298450" algn="l"><a:lnSpc><a:spcPct val="100000"></a:spcPct></a:lnSpc><a:spcBef><a:spcPts val="1700"></a:spcPts></a:spcBef><a:spcAft><a:spcPts val="0"></a:spcPts></a:spcAft><a:buClr><a:srgbClr val="000000"></a:srgbClr></a:buClr><a:buSzPts val="1100"></a:buSzPts><a:buFont typeface="Helvetica Neue"></a:buFont><a:buChar char="•"></a:buChar><a:defRPr sz="1400" b="0" i="0" u="none" strike="noStrike" cap="none"><a:solidFill><a:srgbClr val="000000"></a:srgbClr></a:solidFill><a:latin typeface="Helvetica Neue"></a:latin><a:ea typeface="Helvetica Neue"></a:ea><a:cs typeface="Helvetica Neue"></a:cs></a:defRPr></a:lvl5pPr><a:lvl6pPr marL="2743200" marR="0" lvl="5" indent="-317500" algn="l"><a:lnSpc><a:spcPct val="100000"></a:spcPct></a:lnSpc><a:spcBef><a:spcPts val="2200"></a:spcPts></a:spcBef><a:spcAft><a:spcPts val="0"></a:spcPts></a:spcAft><a:buClr><a:srgbClr val="000000"></a:srgbClr></a:buClr><a:buSzPts val="1400"></a:buSzPts><a:buFont typeface="Helvetica Neue"></a:buFont><a:buChar char="•"></a:buChar><a:defRPr sz="1900" b="0" i="0" u="none" strike="noStrike" cap="none"><a:solidFill><a:srgbClr val="000000"></a:srgbClr></a:solidFill><a:latin typeface="Helvetica Neue"></a:latin><a:ea typeface="Helvetica Neue"></a:ea><a:cs typeface="Helvetica Neue"></a:cs></a:defRPr></a:lvl6pPr><a:lvl7pPr marL="3200400" marR="0" lvl="6" indent="-317500" algn="l"><a:lnSpc><a:spcPct val="100000"></a:spcPct></a:lnSpc><a:spcBef><a:spcPts val="2200"></a:spcPts></a:spcBef><a:spcAft><a:spcPts val="0"></a:spcPts></a:spcAft><a:buClr><a:srgbClr val="000000"></a:srgbClr></a:buClr><a:buSzPts val="1400"></a:buSzPts><a:buFont typeface="Helvetica Neue"></a:buFont><a:buChar char="•"></a:buChar><a:defRPr sz="1900" b="0" i="0" u="none" strike="noStrike" cap="none"><a:solidFill><a:srgbClr val="000000"></a:srgbClr></a:solidFill><a:latin typeface="Helvetica Neue"></a:latin><a:ea typeface="Helvetica Neue"></a:ea><a:cs typeface="Helvetica Neue"></a:cs></a:defRPr></a:lvl7pPr><a:lvl8pPr marL="3657600" marR="0" lvl="7" indent="-317500" algn="l"><a:lnSpc><a:spcPct val="100000"></a:spcPct></a:lnSpc><a:spcBef><a:spcPts val="2200"></a:spcPts></a:spcBef><a:spcAft><a:spcPts val="0"></a:spcPts></a:spcAft><a:buClr><a:srgbClr val="000000"></a:srgbClr></a:buClr><a:buSzPts val="1400"></a:buSzPts><a:buFont typeface="Helvetica Neue"></a:buFont><a:buChar char="•"></a:buChar><a:defRPr sz="1900" b="0" i="0" u="none" strike="noStrike" cap="none"><a:solidFill><a:srgbClr val="000000"></a:srgbClr></a:solidFill><a:latin typeface="Helvetica Neue"></a:latin><a:ea typeface="Helvetica Neue"></a:ea><a:cs typeface="Helvetica Neue"></a:cs></a:defRPr></a:lvl8pPr><a:lvl9pPr marL="4114800" marR="0" lvl="8" indent="-317500" algn="l"><a:lnSpc><a:spcPct val="100000"></a:spcPct></a:lnSpc><a:spcBef><a:spcPts val="2200"></a:spcPts></a:spcBef><a:spcAft><a:spcPts val="0"></a:spcPts></a:spcAft><a:buClr><a:srgbClr val="000000"></a:srgbClr></a:buClr><a:buSzPts val="1400"></a:buSzPts><a:buFont typeface="Helvetica Neue"></a:buFont><a:buChar char="•"></a:buChar><a:defRPr sz="1900" b="0" i="0" u="none" strike="noStrike" cap="none"><a:solidFill><a:srgbClr val="000000"></a:srgbClr></a:solidFill><a:latin typeface="Helvetica Neue"></a:latin><a:ea typeface="Helvetica Neue"></a:ea><a:cs typeface="Helvetica Neue"></a:cs></a:defRPr></a:lvl9pPr></a:lstStyle><a:p><a:pPr><a:defRPr></a:defRPr></a:pPr><a:endParaRPr></a:endParaRPr></a:p></p:txBody></p:sp><p:sp><p:nvSpPr><p:cNvPr id="151" name="Google Shape;151;p44"></p:cNvPr><p:cNvSpPr txBox="1"></p:cNvSpPr><p:nvPr><p:ph type="sldNum" idx="12"></p:ph></p:nvPr></p:nvSpPr><p:spPr bwMode="auto"><a:xfrm><a:off x="3804541" y="9541073"></a:off><a:ext cx="157500" cy="375000"></a:ext></a:xfrm><a:prstGeom prst="rect"><a:avLst/></a:prstGeom><a:noFill/><a:ln><a:noFill/></a:ln></p:spPr><p:txBody><a:bodyPr spcFirstLastPara="1" wrap="square" lIns="26775" tIns="26775" rIns="26775" bIns="26775" anchor="t" anchorCtr="0"><a:noAutofit/></a:bodyPr><a:lstStyle><a:lvl1pPr marL="0" marR="0" lvl="0" indent="0" algn="ctr"><a:lnSpc><a:spcPct val="100000"></a:spcPct></a:lnSpc><a:spcBef><a:spcPts val="0"></a:spcPts></a:spcBef><a:spcAft><a:spcPts val="0"></a:spcPts></a:spcAft><a:buClr><a:srgbClr val="000000"></a:srgbClr></a:buClr><a:buFont typeface="Helvetica Neue"></a:buFont><a:buNone/><a:defRPr sz="900" b="0" i="0" u="none" strike="noStrike" cap="none"><a:solidFill><a:srgbClr val="000000"></a:srgbClr></a:solidFill><a:latin typeface="Helvetica Neue"></a:latin><a:ea typeface="Helvetica Neue"></a:ea><a:cs typeface="Helvetica Neue"></a:cs></a:defRPr></a:lvl1pPr><a:lvl2pPr marL="0" marR="0" lvl="1" indent="0" algn="ctr"><a:lnSpc><a:spcPct val="100000"></a:spcPct></a:lnSpc><a:spcBef><a:spcPts val="0"></a:spcPts></a:spcBef><a:spcAft><a:spcPts val="0"></a:spcPts></a:spcAft><a:buClr><a:srgbClr val="000000"></a:srgbClr></a:buClr><a:buFont typeface="Helvetica Neue"></a:buFont><a:buNone/><a:defRPr sz="900" b="0" i="0" u="none" strike="noStrike" cap="none"><a:solidFill><a:srgbClr val="000000"></a:srgbClr></a:solidFill><a:latin typeface="Helvetica Neue"></a:latin><a:ea typeface="Helvetica Neue"></a:ea><a:cs typeface="Helvetica Neue"></a:cs></a:defRPr></a:lvl2pPr><a:lvl3pPr marL="0" marR="0" lvl="2" indent="0" algn="ctr"><a:lnSpc><a:spcPct val="100000"></a:spcPct></a:lnSpc><a:spcBef><a:spcPts val="0"></a:spcPts></a:spcBef><a:spcAft><a:spcPts val="0"></a:spcPts></a:spcAft><a:buClr><a:srgbClr val="000000"></a:srgbClr></a:buClr><a:buFont typeface="Helvetica Neue"></a:buFont><a:buNone/><a:defRPr sz="900" b="0" i="0" u="none" strike="noStrike" cap="none"><a:solidFill><a:srgbClr val="000000"></a:srgbClr></a:solidFill><a:latin typeface="Helvetica Neue"></a:latin><a:ea typeface="Helvetica Neue"></a:ea><a:cs typeface="Helvetica Neue"></a:cs></a:defRPr></a:lvl3pPr><a:lvl4pPr marL="0" marR="0" lvl="3" indent="0" algn="ctr"><a:lnSpc><a:spcPct val="100000"></a:spcPct></a:lnSpc><a:spcBef><a:spcPts val="0"></a:spcPts></a:spcBef><a:spcAft><a:spcPts val="0"></a:spcPts></a:spcAft><a:buClr><a:srgbClr val="000000"></a:srgbClr></a:buClr><a:buFont typeface="Helvetica Neue"></a:buFont><a:buNone/><a:defRPr sz="900" b="0" i="0" u="none" strike="noStrike" cap="none"><a:solidFill><a:srgbClr val="000000"></a:srgbClr></a:solidFill><a:latin typeface="Helvetica Neue"></a:latin><a:ea typeface="Helvetica Neue"></a:ea><a:cs typeface="Helvetica Neue"></a:cs></a:defRPr></a:lvl4pPr><a:lvl5pPr marL="0" marR="0" lvl="4" indent="0" algn="ctr"><a:lnSpc><a:spcPct val="100000"></a:spcPct></a:lnSpc><a:spcBef><a:spcPts val="0"></a:spcPts></a:spcBef><a:spcAft><a:spcPts val="0"></a:spcPts></a:spcAft><a:buClr><a:srgbClr val="000000"></a:srgbClr></a:buClr><a:buFont typeface="Helvetica Neue"></a:buFont><a:buNone/><a:defRPr sz="900" b="0" i="0" u="none" strike="noStrike" cap="none"><a:solidFill><a:srgbClr val="000000"></a:srgbClr></a:solidFill><a:latin typeface="Helvetica Neue"></a:latin><a:ea typeface="Helvetica Neue"></a:ea><a:cs typeface="Helvetica Neue"></a:cs></a:defRPr></a:lvl5pPr><a:lvl6pPr marL="0" marR="0" lvl="5" indent="0" algn="ctr"><a:lnSpc><a:spcPct val="100000"></a:spcPct></a:lnSpc><a:spcBef><a:spcPts val="0"></a:spcPts></a:spcBef><a:spcAft><a:spcPts val="0"></a:spcPts></a:spcAft><a:buClr><a:srgbClr val="000000"></a:srgbClr></a:buClr><a:buFont typeface="Helvetica Neue"></a:buFont><a:buNone/><a:defRPr sz="900" b="0" i="0" u="none" strike="noStrike" cap="none"><a:solidFill><a:srgbClr val="000000"></a:srgbClr></a:solidFill><a:latin typeface="Helvetica Neue"></a:latin><a:ea typeface="Helvetica Neue"></a:ea><a:cs typeface="Helvetica Neue"></a:cs></a:defRPr></a:lvl6pPr><a:lvl7pPr marL="0" marR="0" lvl="6" indent="0" algn="ctr"><a:lnSpc><a:spcPct val="100000"></a:spcPct></a:lnSpc><a:spcBef><a:spcPts val="0"></a:spcPts></a:spcBef><a:spcAft><a:spcPts val="0"></a:spcPts></a:spcAft><a:buClr><a:srgbClr val="000000"></a:srgbClr></a:buClr><a:buFont typeface="Helvetica Neue"></a:buFont><a:buNone/><a:defRPr sz="900" b="0" i="0" u="none" strike="noStrike" cap="none"><a:solidFill><a:srgbClr val="000000"></a:srgbClr></a:solidFill><a:latin typeface="Helvetica Neue"></a:latin><a:ea typeface="Helvetica Neue"></a:ea><a:cs typeface="Helvetica Neue"></a:cs></a:defRPr></a:lvl7pPr><a:lvl8pPr marL="0" marR="0" lvl="7" indent="0" algn="ctr"><a:lnSpc><a:spcPct val="100000"></a:spcPct></a:lnSpc><a:spcBef><a:spcPts val="0"></a:spcPts></a:spcBef><a:spcAft><a:spcPts val="0"></a:spcPts></a:spcAft><a:buClr><a:srgbClr val="000000"></a:srgbClr></a:buClr><a:buFont typeface="Helvetica Neue"></a:buFont><a:buNone/><a:defRPr sz="900" b="0" i="0" u="none" strike="noStrike" cap="none"><a:solidFill><a:srgbClr val="000000"></a:srgbClr></a:solidFill><a:latin typeface="Helvetica Neue"></a:latin><a:ea typeface="Helvetica Neue"></a:ea><a:cs typeface="Helvetica Neue"></a:cs></a:defRPr></a:lvl8pPr><a:lvl9pPr marL="0" marR="0" lvl="8" indent="0" algn="ctr"><a:lnSpc><a:spcPct val="100000"></a:spcPct></a:lnSpc><a:spcBef><a:spcPts val="0"></a:spcPts></a:spcBef><a:spcAft><a:spcPts val="0"></a:spcPts></a:spcAft><a:buClr><a:srgbClr val="000000"></a:srgbClr></a:buClr><a:buFont typeface="Helvetica Neue"></a:buFont><a:buNone/><a:defRPr sz="900" b="0" i="0" u="none" strike="noStrike" cap="none"><a:solidFill><a:srgbClr val="000000"></a:srgbClr></a:solidFill><a:latin typeface="Helvetica Neue"></a:latin><a:ea typeface="Helvetica Neue"></a:ea><a:cs typeface="Helvetica Neue"></a:cs></a:defRPr></a:lvl9pPr></a:lstStyle><a:p><a:pPr marL="0" lvl="0" indent="0" algn="ctr"><a:spcBef><a:spcPts val="0"></a:spcPts></a:spcBef><a:spcAft><a:spcPts val="0"></a:spcPts></a:spcAft><a:buNone/><a:defRPr></a:defRPr></a:pPr><a:fld id="{00000000-1234-1234-1234-123412341234}" type="slidenum"><a:rPr lang="en"></a:rPr><a:t></a:t></a:fld><a:endParaRPr></a:endParaRPr></a:p></p:txBody></p:sp></p:spTree></p:cSld><p:clrMapOvr><a:masterClrMapping/></p:clrMapOvr></p:sldLayout>
+<file path=ppt/slideLayouts/slideLayout29.xml><?xml version="1.0" encoding="utf-8"?>
+<p:sldLayout xmlns:a="http://schemas.openxmlformats.org/drawingml/2006/main" xmlns:r="http://schemas.openxmlformats.org/officeDocument/2006/relationships" xmlns:p="http://schemas.openxmlformats.org/presentationml/2006/main" xmlns:m="http://schemas.openxmlformats.org/officeDocument/2006/math" xmlns:w="http://schemas.openxmlformats.org/wordprocessingml/2006/main" matchingName="" preserve="0" showMasterPhAnim="0" userDrawn="1">
+  <p:cSld name="">
+    <p:spTree>
+      <p:nvGrpSpPr>
+        <p:cNvPr id="1" name=""/>
+        <p:cNvGrpSpPr/>
+        <p:nvPr/>
+      </p:nvGrpSpPr>
+      <p:grpSpPr bwMode="auto">
+        <a:xfrm>
+          <a:off x="0" y="0"/>
+          <a:ext cx="0" cy="0"/>
+          <a:chOff x="0" y="0"/>
+          <a:chExt cx="0" cy="0"/>
+        </a:xfrm>
+      </p:grpSpPr>
+    </p:spTree>
+  </p:cSld>
+  <p:clrMapOvr>
+    <a:masterClrMapping/>
+  </p:clrMapOvr>
+</p:sldLayout>
 </file>
 
 <file path=ppt/slideLayouts/slideLayout3.xml><?xml version="1.0" encoding="utf-8"?>
@@ -18681,7 +18747,7 @@
           </a:prstGeom>
         </p:spPr>
         <p:txBody>
-          <a:bodyPr spcFirstLastPara="1" wrap="square" lIns="91424" tIns="91424" rIns="91424" bIns="91424" anchor="t" anchorCtr="0">
+          <a:bodyPr spcFirstLastPara="1" wrap="square" lIns="91423" tIns="91423" rIns="91423" bIns="91423" anchor="t" anchorCtr="0">
             <a:noAutofit/>
           </a:bodyPr>
           <a:lstStyle/>
@@ -19103,7 +19169,7 @@
           </a:prstGeom>
         </p:spPr>
         <p:txBody>
-          <a:bodyPr spcFirstLastPara="1" wrap="square" lIns="91424" tIns="91424" rIns="91424" bIns="91424" anchor="t" anchorCtr="0">
+          <a:bodyPr spcFirstLastPara="1" wrap="square" lIns="91423" tIns="91423" rIns="91423" bIns="91423" anchor="t" anchorCtr="0">
             <a:noAutofit/>
           </a:bodyPr>
           <a:lstStyle/>
@@ -20282,7 +20348,7 @@
         </p:nvSpPr>
         <p:spPr bwMode="auto">
           <a:xfrm flipH="0" flipV="0">
-            <a:off x="457200" y="447674"/>
+            <a:off x="465150" y="447673"/>
             <a:ext cx="6842099" cy="5092554"/>
           </a:xfrm>
           <a:prstGeom prst="rect">
@@ -20294,7 +20360,7 @@
           </a:ln>
         </p:spPr>
         <p:txBody>
-          <a:bodyPr spcFirstLastPara="1" wrap="square" lIns="91424" tIns="91424" rIns="91424" bIns="91424" anchor="t" anchorCtr="0">
+          <a:bodyPr spcFirstLastPara="1" wrap="square" lIns="91423" tIns="91423" rIns="91423" bIns="91423" anchor="t" anchorCtr="0">
             <a:noAutofit/>
           </a:bodyPr>
           <a:lstStyle/>
@@ -20302,30 +20368,406 @@
             <a:pPr>
               <a:defRPr/>
             </a:pPr>
+            <a:endParaRPr/>
+          </a:p>
+          <a:p>
+            <a:pPr>
+              <a:defRPr/>
+            </a:pPr>
             <a:r>
-              <a:rPr/>
+              <a:rPr sz="1050" b="1" i="0" u="none">
+                <a:solidFill>
+                  <a:srgbClr val="000709"/>
+                </a:solidFill>
+                <a:latin typeface="Open Sans"/>
+                <a:ea typeface="Open Sans"/>
+                <a:cs typeface="Open Sans"/>
+              </a:rPr>
+              <a:t>Role 1 - Data Steward:</a:t>
+            </a:r>
+            <a:endParaRPr/>
+          </a:p>
+          <a:p>
+            <a:pPr>
+              <a:defRPr/>
+            </a:pPr>
+            <a:r>
+              <a:rPr lang="en-US" sz="1200" b="0" i="0" u="none" strike="noStrike" cap="none" spc="0">
+                <a:solidFill>
+                  <a:srgbClr val="2E2E2E"/>
+                </a:solidFill>
+                <a:latin typeface="Liberation Sans"/>
+                <a:ea typeface="Liberation Sans"/>
+                <a:cs typeface="Liberation Sans"/>
+              </a:rPr>
+              <a:t>supporting the user community</a:t>
+            </a:r>
+            <a:endParaRPr sz="1200"/>
+          </a:p>
+          <a:p>
+            <a:pPr>
+              <a:defRPr/>
+            </a:pPr>
+            <a:r>
+              <a:rPr lang="en-US" sz="1200" b="0" i="0" u="none" strike="noStrike" cap="none" spc="0">
+                <a:solidFill>
+                  <a:srgbClr val="2E2E2E"/>
+                </a:solidFill>
+                <a:latin typeface="Liberation Sans"/>
+                <a:ea typeface="Liberation Sans"/>
+                <a:cs typeface="Liberation Sans"/>
+              </a:rPr>
+              <a:t>collecting, collating, and evaluating issues and problems with data</a:t>
+            </a:r>
+            <a:br>
+              <a:rPr sz="1200" b="0" i="0" u="none">
+                <a:solidFill>
+                  <a:srgbClr val="000709"/>
+                </a:solidFill>
+                <a:latin typeface="Open Sans"/>
+                <a:ea typeface="Open Sans"/>
+                <a:cs typeface="Open Sans"/>
+              </a:rPr>
+            </a:br>
+            <a:r>
+              <a:rPr sz="1200" b="0" i="0" u="none">
+                <a:solidFill>
+                  <a:srgbClr val="000709"/>
+                </a:solidFill>
+                <a:latin typeface="Open Sans"/>
+                <a:ea typeface="Open Sans"/>
+                <a:cs typeface="Open Sans"/>
+              </a:rPr>
+              <a:t>I think Jessica should handle this role as she is a subject matter on many areas and does understand the true definition of data in different domains.</a:t>
+            </a:r>
+            <a:endParaRPr sz="1200" b="0" i="0" u="none">
+              <a:solidFill>
+                <a:srgbClr val="000709"/>
+              </a:solidFill>
+              <a:latin typeface="Open Sans"/>
+              <a:ea typeface="Open Sans"/>
+              <a:cs typeface="Open Sans"/>
+            </a:endParaRPr>
+          </a:p>
+          <a:p>
+            <a:pPr>
+              <a:defRPr/>
+            </a:pPr>
+            <a:endParaRPr/>
+          </a:p>
+          <a:p>
+            <a:pPr>
+              <a:defRPr/>
+            </a:pPr>
+            <a:r>
+              <a:rPr sz="1050" b="1" i="0" u="none">
+                <a:solidFill>
+                  <a:srgbClr val="000709"/>
+                </a:solidFill>
+                <a:latin typeface="Open Sans"/>
+                <a:ea typeface="Open Sans"/>
+                <a:cs typeface="Open Sans"/>
+              </a:rPr>
+              <a:t>Role 2 – Data Engineer:</a:t>
+            </a:r>
+            <a:endParaRPr/>
+          </a:p>
+          <a:p>
+            <a:pPr>
+              <a:defRPr/>
+            </a:pPr>
+            <a:r>
+              <a:rPr lang="en-US" sz="1200" b="0" i="0" u="none" strike="noStrike" cap="none" spc="0">
+                <a:solidFill>
+                  <a:srgbClr val="2E2E2E"/>
+                </a:solidFill>
+                <a:latin typeface="Liberation Sans"/>
+                <a:ea typeface="Liberation Sans"/>
+                <a:cs typeface="Liberation Sans"/>
+              </a:rPr>
+              <a:t>Design, developed and curation of data pipelines</a:t>
+            </a:r>
+            <a:endParaRPr sz="1200"/>
+          </a:p>
+          <a:p>
+            <a:pPr>
+              <a:defRPr/>
+            </a:pPr>
+            <a:r>
+              <a:rPr lang="en-US" sz="1200" b="0" i="0" u="none" strike="noStrike" cap="none" spc="0">
+                <a:solidFill>
+                  <a:srgbClr val="2E2E2E"/>
+                </a:solidFill>
+                <a:latin typeface="Liberation Sans"/>
+                <a:ea typeface="Liberation Sans"/>
+                <a:cs typeface="Liberation Sans"/>
+              </a:rPr>
+              <a:t>Ensures that data is available in the right format for various business cases</a:t>
+            </a:r>
+            <a:br>
+              <a:rPr lang="en-US" sz="1200" b="0" i="0" u="none" strike="noStrike" cap="none" spc="0">
+                <a:solidFill>
+                  <a:srgbClr val="000709"/>
+                </a:solidFill>
+                <a:latin typeface="Open Sans"/>
+                <a:ea typeface="Open Sans"/>
+                <a:cs typeface="Open Sans"/>
+              </a:rPr>
+            </a:br>
+            <a:r>
+              <a:rPr lang="en-US" sz="1200" b="0" i="0" u="none" strike="noStrike" cap="none" spc="0">
+                <a:solidFill>
+                  <a:srgbClr val="000709"/>
+                </a:solidFill>
+                <a:latin typeface="Open Sans"/>
+                <a:ea typeface="Open Sans"/>
+                <a:cs typeface="Open Sans"/>
+              </a:rPr>
+              <a:t>I think Jake should handle this position as he is the guy who has a lot of skill in database administration and has been fixing data issues in the past. </a:t>
+            </a:r>
+            <a:endParaRPr sz="1200"/>
+          </a:p>
+          <a:p>
+            <a:pPr>
+              <a:defRPr/>
+            </a:pPr>
+            <a:endParaRPr/>
+          </a:p>
+          <a:p>
+            <a:pPr>
+              <a:defRPr/>
+            </a:pPr>
+            <a:r>
+              <a:rPr sz="1050" b="1" i="0" u="none">
+                <a:solidFill>
+                  <a:srgbClr val="000709"/>
+                </a:solidFill>
+                <a:latin typeface="Open Sans"/>
+                <a:ea typeface="Open Sans"/>
+                <a:cs typeface="Open Sans"/>
+              </a:rPr>
+              <a:t>Role 3 – Data Architect:</a:t>
+            </a:r>
+            <a:endParaRPr/>
+          </a:p>
+          <a:p>
+            <a:pPr>
+              <a:defRPr/>
+            </a:pPr>
+            <a:r>
+              <a:rPr sz="1050" b="0" i="0" u="none">
+                <a:solidFill>
+                  <a:srgbClr val="000709"/>
+                </a:solidFill>
+                <a:latin typeface="Open Sans"/>
+                <a:ea typeface="Open Sans"/>
+                <a:cs typeface="Open Sans"/>
+              </a:rPr>
+              <a:t>Ensure that right data is provided with the right amount of quality to the right stakeholders</a:t>
+            </a:r>
+            <a:endParaRPr/>
+          </a:p>
+          <a:p>
+            <a:pPr>
+              <a:defRPr/>
+            </a:pPr>
+            <a:r>
+              <a:rPr sz="1050" b="0" i="0" u="none">
+                <a:solidFill>
+                  <a:srgbClr val="000709"/>
+                </a:solidFill>
+                <a:latin typeface="Open Sans"/>
+                <a:ea typeface="Open Sans"/>
+                <a:cs typeface="Open Sans"/>
+              </a:rPr>
+              <a:t>Designs, and maintains large-scale data-intensive systems. </a:t>
+            </a:r>
+            <a:br>
+              <a:rPr sz="1050" b="0" i="0" u="none">
+                <a:solidFill>
+                  <a:srgbClr val="000709"/>
+                </a:solidFill>
+                <a:latin typeface="Open Sans"/>
+                <a:ea typeface="Open Sans"/>
+                <a:cs typeface="Open Sans"/>
+              </a:rPr>
+            </a:br>
+            <a:r>
+              <a:rPr sz="1050" b="0" i="0" u="none">
+                <a:solidFill>
+                  <a:srgbClr val="000709"/>
+                </a:solidFill>
+                <a:latin typeface="Open Sans"/>
+                <a:ea typeface="Open Sans"/>
+                <a:cs typeface="Open Sans"/>
+              </a:rPr>
+              <a:t>I think I will be responsible for this as I’ve got a goo understanding of various area of data structure from modeling to meta data management, to master data management and data quality. </a:t>
+            </a:r>
+            <a:br>
+              <a:rPr sz="1050" b="0" i="0" u="none">
+                <a:solidFill>
+                  <a:srgbClr val="000709"/>
+                </a:solidFill>
+                <a:latin typeface="Open Sans"/>
+                <a:ea typeface="Open Sans"/>
+                <a:cs typeface="Open Sans"/>
+              </a:rPr>
+            </a:br>
+            <a:br>
+              <a:rPr sz="1050" b="0" i="0" u="none">
+                <a:solidFill>
+                  <a:srgbClr val="000709"/>
+                </a:solidFill>
+                <a:latin typeface="Open Sans"/>
+                <a:ea typeface="Open Sans"/>
+                <a:cs typeface="Open Sans"/>
+              </a:rPr>
+            </a:br>
+            <a:r>
+              <a:rPr sz="1050" b="0" i="0" u="none">
+                <a:solidFill>
+                  <a:srgbClr val="000709"/>
+                </a:solidFill>
+                <a:latin typeface="Open Sans"/>
+                <a:ea typeface="Open Sans"/>
+                <a:cs typeface="Open Sans"/>
+              </a:rPr>
+              <a:t>Discussion: </a:t>
+            </a:r>
+            <a:br>
+              <a:rPr sz="1050" b="0" i="0" u="none">
+                <a:solidFill>
+                  <a:srgbClr val="000709"/>
+                </a:solidFill>
+                <a:latin typeface="Open Sans"/>
+                <a:ea typeface="Open Sans"/>
+                <a:cs typeface="Open Sans"/>
+              </a:rPr>
+            </a:br>
+            <a:br>
+              <a:rPr sz="1050" b="0" i="0" u="none">
+                <a:solidFill>
+                  <a:srgbClr val="000709"/>
+                </a:solidFill>
+                <a:latin typeface="Open Sans"/>
+                <a:ea typeface="Open Sans"/>
+                <a:cs typeface="Open Sans"/>
+              </a:rPr>
+            </a:br>
+            <a:r>
+              <a:rPr lang="en-US" sz="1050" b="0" i="0" u="none" strike="noStrike" cap="none" spc="0">
+                <a:solidFill>
+                  <a:srgbClr val="000000"/>
+                </a:solidFill>
+                <a:latin typeface="Arial"/>
+                <a:ea typeface="Arial"/>
+                <a:cs typeface="Arial"/>
+              </a:rPr>
               <a:t>This new data governance requires several key roles in order to sustain and grow. One of the main roles is the data architect that foresees upcoming challenges and adjust components of the data governance architecture to it. The same stakeholder takes part in new initiatives and suggestions. </a:t>
             </a:r>
             <a:br>
-              <a:rPr/>
+              <a:rPr lang="en-US" sz="1050" b="0" i="0" u="none" strike="noStrike" cap="none" spc="0">
+                <a:solidFill>
+                  <a:srgbClr val="000000"/>
+                </a:solidFill>
+                <a:latin typeface="Arial"/>
+                <a:ea typeface="Arial"/>
+                <a:cs typeface="Arial"/>
+              </a:rPr>
             </a:br>
             <a:br>
-              <a:rPr/>
+              <a:rPr lang="en-US" sz="1050" b="0" i="0" u="none" strike="noStrike" cap="none" spc="0">
+                <a:solidFill>
+                  <a:srgbClr val="000000"/>
+                </a:solidFill>
+                <a:latin typeface="Arial"/>
+                <a:ea typeface="Arial"/>
+                <a:cs typeface="Arial"/>
+              </a:rPr>
             </a:br>
             <a:r>
-              <a:rPr/>
+              <a:rPr lang="en-US" sz="1050" b="0" i="0" u="none" strike="noStrike" cap="none" spc="0">
+                <a:solidFill>
+                  <a:srgbClr val="000000"/>
+                </a:solidFill>
+                <a:latin typeface="Arial"/>
+                <a:ea typeface="Arial"/>
+                <a:cs typeface="Arial"/>
+              </a:rPr>
               <a:t>Another key role is the data engineer that creates meta data management systems, data quality dashboards, and master data management pipelines. While data engineers and data architects are really important in development of the Sneaker park’s data governance initiative, data steward and data owners are as important for operating and maintaining these systems. </a:t>
             </a:r>
             <a:br>
-              <a:rPr/>
+              <a:rPr lang="en-US" sz="1050" b="0" i="0" u="none" strike="noStrike" cap="none" spc="0">
+                <a:solidFill>
+                  <a:srgbClr val="000000"/>
+                </a:solidFill>
+                <a:latin typeface="Arial"/>
+                <a:ea typeface="Arial"/>
+                <a:cs typeface="Arial"/>
+              </a:rPr>
             </a:br>
             <a:br>
-              <a:rPr/>
+              <a:rPr lang="en-US" sz="1050" b="0" i="0" u="none" strike="noStrike" cap="none" spc="0">
+                <a:solidFill>
+                  <a:srgbClr val="000000"/>
+                </a:solidFill>
+                <a:latin typeface="Arial"/>
+                <a:ea typeface="Arial"/>
+                <a:cs typeface="Arial"/>
+              </a:rPr>
             </a:br>
             <a:r>
-              <a:rPr/>
+              <a:rPr lang="en-US" sz="1050" b="0" i="0" u="none" strike="noStrike" cap="none" spc="0">
+                <a:solidFill>
+                  <a:srgbClr val="000000"/>
+                </a:solidFill>
+                <a:latin typeface="Arial"/>
+                <a:ea typeface="Arial"/>
+                <a:cs typeface="Arial"/>
+              </a:rPr>
               <a:t>Data stewards ensure that correct metadata is in place, data are matched in master data sets based on correct rules, and data quality threshold are defined correctly. On the other hand, data owners ensure that business metadata is defined correctly for their domain, the corresponding data has the required qualities and master data is in an acceptable structure. </a:t>
             </a:r>
+            <a:endParaRPr sz="1050"/>
+          </a:p>
+          <a:p>
+            <a:pPr>
+              <a:defRPr/>
+            </a:pPr>
+            <a:endParaRPr sz="1050"/>
+          </a:p>
+          <a:p>
+            <a:pPr>
+              <a:defRPr/>
+            </a:pPr>
+            <a:endParaRPr sz="1050"/>
+          </a:p>
+          <a:p>
+            <a:pPr>
+              <a:defRPr/>
+            </a:pPr>
+            <a:endParaRPr sz="1050"/>
+          </a:p>
+          <a:p>
+            <a:pPr>
+              <a:defRPr/>
+            </a:pPr>
+            <a:r>
+              <a:rPr lang="en-US" sz="1050" b="0" i="0" u="none" strike="noStrike" cap="none" spc="0">
+                <a:solidFill>
+                  <a:srgbClr val="2E2E2E"/>
+                </a:solidFill>
+                <a:latin typeface="Liberation Sans"/>
+                <a:ea typeface="Liberation Sans"/>
+                <a:cs typeface="Liberation Sans"/>
+              </a:rPr>
+              <a:t>The data steward's role essentially is to support the user community. This individual is responsible for collecting, collating, and evaluating issues and problems with data. Typically, data stewards are assigned either based on subject areas or within line-of-business responsibilities</a:t>
+            </a:r>
+            <a:endParaRPr sz="1050"/>
+          </a:p>
+          <a:p>
+            <a:pPr>
+              <a:defRPr/>
+            </a:pPr>
             <a:endParaRPr/>
           </a:p>
         </p:txBody>

</xml_diff>

<commit_message>
updated, solved some data in regards to data quality issues
</commit_message>
<xml_diff>
--- a/starter-template (3).pptx
+++ b/starter-template (3).pptx
@@ -17855,8 +17855,8 @@
         </p:blipFill>
         <p:spPr bwMode="auto">
           <a:xfrm flipH="0" flipV="0">
-            <a:off x="1636761" y="4227099"/>
-            <a:ext cx="4751999" cy="5111714"/>
+            <a:off x="951106" y="4227097"/>
+            <a:ext cx="5631460" cy="5111712"/>
           </a:xfrm>
           <a:prstGeom prst="rect">
             <a:avLst/>
@@ -20348,7 +20348,7 @@
         </p:nvSpPr>
         <p:spPr bwMode="auto">
           <a:xfrm flipH="0" flipV="0">
-            <a:off x="465150" y="447673"/>
+            <a:off x="465149" y="447673"/>
             <a:ext cx="6842099" cy="5092554"/>
           </a:xfrm>
           <a:prstGeom prst="rect">

</xml_diff>